<commit_message>
Musician QR files are registered/uploaded
</commit_message>
<xml_diff>
--- a/Descriptions/WwwQrCodeImages.pptx
+++ b/Descriptions/WwwQrCodeImages.pptx
@@ -250,7 +250,7 @@
           <a:p>
             <a:fld id="{9A42C61D-D669-4B9E-81E6-AA43D08BFCD1}" type="datetimeFigureOut">
               <a:rPr lang="de-CH" smtClean="0"/>
-              <a:t>15.05.2022</a:t>
+              <a:t>16.05.2022</a:t>
             </a:fld>
             <a:endParaRPr lang="de-CH"/>
           </a:p>
@@ -420,7 +420,7 @@
           <a:p>
             <a:fld id="{9A42C61D-D669-4B9E-81E6-AA43D08BFCD1}" type="datetimeFigureOut">
               <a:rPr lang="de-CH" smtClean="0"/>
-              <a:t>15.05.2022</a:t>
+              <a:t>16.05.2022</a:t>
             </a:fld>
             <a:endParaRPr lang="de-CH"/>
           </a:p>
@@ -600,7 +600,7 @@
           <a:p>
             <a:fld id="{9A42C61D-D669-4B9E-81E6-AA43D08BFCD1}" type="datetimeFigureOut">
               <a:rPr lang="de-CH" smtClean="0"/>
-              <a:t>15.05.2022</a:t>
+              <a:t>16.05.2022</a:t>
             </a:fld>
             <a:endParaRPr lang="de-CH"/>
           </a:p>
@@ -770,7 +770,7 @@
           <a:p>
             <a:fld id="{9A42C61D-D669-4B9E-81E6-AA43D08BFCD1}" type="datetimeFigureOut">
               <a:rPr lang="de-CH" smtClean="0"/>
-              <a:t>15.05.2022</a:t>
+              <a:t>16.05.2022</a:t>
             </a:fld>
             <a:endParaRPr lang="de-CH"/>
           </a:p>
@@ -1016,7 +1016,7 @@
           <a:p>
             <a:fld id="{9A42C61D-D669-4B9E-81E6-AA43D08BFCD1}" type="datetimeFigureOut">
               <a:rPr lang="de-CH" smtClean="0"/>
-              <a:t>15.05.2022</a:t>
+              <a:t>16.05.2022</a:t>
             </a:fld>
             <a:endParaRPr lang="de-CH"/>
           </a:p>
@@ -1248,7 +1248,7 @@
           <a:p>
             <a:fld id="{9A42C61D-D669-4B9E-81E6-AA43D08BFCD1}" type="datetimeFigureOut">
               <a:rPr lang="de-CH" smtClean="0"/>
-              <a:t>15.05.2022</a:t>
+              <a:t>16.05.2022</a:t>
             </a:fld>
             <a:endParaRPr lang="de-CH"/>
           </a:p>
@@ -1615,7 +1615,7 @@
           <a:p>
             <a:fld id="{9A42C61D-D669-4B9E-81E6-AA43D08BFCD1}" type="datetimeFigureOut">
               <a:rPr lang="de-CH" smtClean="0"/>
-              <a:t>15.05.2022</a:t>
+              <a:t>16.05.2022</a:t>
             </a:fld>
             <a:endParaRPr lang="de-CH"/>
           </a:p>
@@ -1733,7 +1733,7 @@
           <a:p>
             <a:fld id="{9A42C61D-D669-4B9E-81E6-AA43D08BFCD1}" type="datetimeFigureOut">
               <a:rPr lang="de-CH" smtClean="0"/>
-              <a:t>15.05.2022</a:t>
+              <a:t>16.05.2022</a:t>
             </a:fld>
             <a:endParaRPr lang="de-CH"/>
           </a:p>
@@ -1828,7 +1828,7 @@
           <a:p>
             <a:fld id="{9A42C61D-D669-4B9E-81E6-AA43D08BFCD1}" type="datetimeFigureOut">
               <a:rPr lang="de-CH" smtClean="0"/>
-              <a:t>15.05.2022</a:t>
+              <a:t>16.05.2022</a:t>
             </a:fld>
             <a:endParaRPr lang="de-CH"/>
           </a:p>
@@ -2105,7 +2105,7 @@
           <a:p>
             <a:fld id="{9A42C61D-D669-4B9E-81E6-AA43D08BFCD1}" type="datetimeFigureOut">
               <a:rPr lang="de-CH" smtClean="0"/>
-              <a:t>15.05.2022</a:t>
+              <a:t>16.05.2022</a:t>
             </a:fld>
             <a:endParaRPr lang="de-CH"/>
           </a:p>
@@ -2358,7 +2358,7 @@
           <a:p>
             <a:fld id="{9A42C61D-D669-4B9E-81E6-AA43D08BFCD1}" type="datetimeFigureOut">
               <a:rPr lang="de-CH" smtClean="0"/>
-              <a:t>15.05.2022</a:t>
+              <a:t>16.05.2022</a:t>
             </a:fld>
             <a:endParaRPr lang="de-CH"/>
           </a:p>
@@ -2571,7 +2571,7 @@
           <a:p>
             <a:fld id="{9A42C61D-D669-4B9E-81E6-AA43D08BFCD1}" type="datetimeFigureOut">
               <a:rPr lang="de-CH" smtClean="0"/>
-              <a:t>15.05.2022</a:t>
+              <a:t>16.05.2022</a:t>
             </a:fld>
             <a:endParaRPr lang="de-CH"/>
           </a:p>
@@ -6367,7 +6367,7 @@
         </p:nvSpPr>
         <p:spPr>
           <a:xfrm>
-            <a:off x="279101" y="3755975"/>
+            <a:off x="279101" y="3319747"/>
             <a:ext cx="1025444" cy="215444"/>
           </a:xfrm>
           <a:prstGeom prst="rect">
@@ -6405,8 +6405,8 @@
         </p:nvSpPr>
         <p:spPr>
           <a:xfrm>
-            <a:off x="1261872" y="668348"/>
-            <a:ext cx="4200143" cy="391984"/>
+            <a:off x="1261872" y="232120"/>
+            <a:ext cx="4341974" cy="391984"/>
           </a:xfrm>
           <a:prstGeom prst="rect">
             <a:avLst/>
@@ -6519,8 +6519,8 @@
         </p:nvSpPr>
         <p:spPr>
           <a:xfrm>
-            <a:off x="1258581" y="1237123"/>
-            <a:ext cx="4200143" cy="373159"/>
+            <a:off x="1258581" y="800895"/>
+            <a:ext cx="4341974" cy="373159"/>
           </a:xfrm>
           <a:prstGeom prst="rect">
             <a:avLst/>
@@ -6683,8 +6683,8 @@
         </p:nvSpPr>
         <p:spPr>
           <a:xfrm>
-            <a:off x="1258580" y="1752979"/>
-            <a:ext cx="4200143" cy="355417"/>
+            <a:off x="1258580" y="1316751"/>
+            <a:ext cx="4341974" cy="355417"/>
           </a:xfrm>
           <a:prstGeom prst="rect">
             <a:avLst/>
@@ -6857,8 +6857,8 @@
         </p:nvSpPr>
         <p:spPr>
           <a:xfrm>
-            <a:off x="1258580" y="2263284"/>
-            <a:ext cx="4200143" cy="355417"/>
+            <a:off x="1258580" y="1827056"/>
+            <a:ext cx="4341974" cy="355417"/>
           </a:xfrm>
           <a:prstGeom prst="rect">
             <a:avLst/>
@@ -7031,8 +7031,8 @@
         </p:nvSpPr>
         <p:spPr>
           <a:xfrm>
-            <a:off x="1258580" y="2787744"/>
-            <a:ext cx="4200143" cy="276975"/>
+            <a:off x="1258580" y="2351516"/>
+            <a:ext cx="4341974" cy="276975"/>
           </a:xfrm>
           <a:prstGeom prst="rect">
             <a:avLst/>
@@ -7122,8 +7122,8 @@
         </p:nvSpPr>
         <p:spPr>
           <a:xfrm>
-            <a:off x="1258580" y="5589007"/>
-            <a:ext cx="4200143" cy="273141"/>
+            <a:off x="1258580" y="5563840"/>
+            <a:ext cx="4341974" cy="273141"/>
           </a:xfrm>
           <a:prstGeom prst="rect">
             <a:avLst/>
@@ -7195,7 +7195,7 @@
         </p:nvCxnSpPr>
         <p:spPr>
           <a:xfrm flipV="1">
-            <a:off x="3293608" y="1069505"/>
+            <a:off x="3293608" y="633277"/>
             <a:ext cx="0" cy="154303"/>
           </a:xfrm>
           <a:prstGeom prst="line">
@@ -7238,7 +7238,7 @@
         </p:nvCxnSpPr>
         <p:spPr>
           <a:xfrm flipV="1">
-            <a:off x="3300187" y="1595608"/>
+            <a:off x="3300187" y="1159380"/>
             <a:ext cx="0" cy="154303"/>
           </a:xfrm>
           <a:prstGeom prst="line">
@@ -7281,7 +7281,7 @@
         </p:nvCxnSpPr>
         <p:spPr>
           <a:xfrm flipV="1">
-            <a:off x="3298183" y="2104883"/>
+            <a:off x="3298183" y="1668655"/>
             <a:ext cx="0" cy="154303"/>
           </a:xfrm>
           <a:prstGeom prst="line">
@@ -7324,7 +7324,7 @@
         </p:nvCxnSpPr>
         <p:spPr>
           <a:xfrm flipV="1">
-            <a:off x="3300187" y="2623950"/>
+            <a:off x="3300187" y="2187722"/>
             <a:ext cx="0" cy="154303"/>
           </a:xfrm>
           <a:prstGeom prst="line">
@@ -7367,7 +7367,7 @@
         </p:nvCxnSpPr>
         <p:spPr>
           <a:xfrm flipV="1">
-            <a:off x="3300187" y="4064818"/>
+            <a:off x="3300187" y="3628590"/>
             <a:ext cx="0" cy="154303"/>
           </a:xfrm>
           <a:prstGeom prst="line">
@@ -7408,8 +7408,8 @@
         </p:nvSpPr>
         <p:spPr>
           <a:xfrm>
-            <a:off x="1253287" y="5996876"/>
-            <a:ext cx="4200143" cy="273141"/>
+            <a:off x="1253287" y="5971709"/>
+            <a:ext cx="4341974" cy="273141"/>
           </a:xfrm>
           <a:prstGeom prst="rect">
             <a:avLst/>
@@ -7479,8 +7479,8 @@
         </p:nvSpPr>
         <p:spPr>
           <a:xfrm>
-            <a:off x="6287619" y="1268519"/>
-            <a:ext cx="4200143" cy="481392"/>
+            <a:off x="6925183" y="1268519"/>
+            <a:ext cx="4341974" cy="481392"/>
           </a:xfrm>
           <a:prstGeom prst="rect">
             <a:avLst/>
@@ -7640,8 +7640,8 @@
         </p:nvSpPr>
         <p:spPr>
           <a:xfrm>
-            <a:off x="6289626" y="1897949"/>
-            <a:ext cx="4200143" cy="273141"/>
+            <a:off x="6927190" y="1897949"/>
+            <a:ext cx="4341974" cy="273141"/>
           </a:xfrm>
           <a:prstGeom prst="rect">
             <a:avLst/>
@@ -7733,7 +7733,7 @@
         </p:nvCxnSpPr>
         <p:spPr>
           <a:xfrm flipV="1">
-            <a:off x="3313343" y="5855564"/>
+            <a:off x="3313343" y="5830397"/>
             <a:ext cx="0" cy="154303"/>
           </a:xfrm>
           <a:prstGeom prst="line">
@@ -7776,7 +7776,7 @@
         </p:nvCxnSpPr>
         <p:spPr>
           <a:xfrm flipV="1">
-            <a:off x="3316633" y="6263427"/>
+            <a:off x="3316633" y="6238260"/>
             <a:ext cx="0" cy="154303"/>
           </a:xfrm>
           <a:prstGeom prst="line">
@@ -7817,8 +7817,8 @@
         </p:nvSpPr>
         <p:spPr>
           <a:xfrm>
-            <a:off x="6292002" y="2301951"/>
-            <a:ext cx="4200143" cy="273141"/>
+            <a:off x="6929566" y="2301951"/>
+            <a:ext cx="4341974" cy="273141"/>
           </a:xfrm>
           <a:prstGeom prst="rect">
             <a:avLst/>
@@ -7930,7 +7930,7 @@
         </p:nvCxnSpPr>
         <p:spPr>
           <a:xfrm flipV="1">
-            <a:off x="8366693" y="1742828"/>
+            <a:off x="9004257" y="1742828"/>
             <a:ext cx="0" cy="154303"/>
           </a:xfrm>
           <a:prstGeom prst="line">
@@ -7973,7 +7973,7 @@
         </p:nvCxnSpPr>
         <p:spPr>
           <a:xfrm flipV="1">
-            <a:off x="8369265" y="2157752"/>
+            <a:off x="9006829" y="2157752"/>
             <a:ext cx="0" cy="154303"/>
           </a:xfrm>
           <a:prstGeom prst="line">
@@ -8014,8 +8014,8 @@
         </p:nvSpPr>
         <p:spPr>
           <a:xfrm>
-            <a:off x="1261872" y="3692386"/>
-            <a:ext cx="4200143" cy="377119"/>
+            <a:off x="1261872" y="3256158"/>
+            <a:ext cx="4341974" cy="377119"/>
           </a:xfrm>
           <a:prstGeom prst="rect">
             <a:avLst/>
@@ -8139,7 +8139,7 @@
                 <a:latin typeface="Arial" panose="020B0604020202020204" pitchFamily="34" charset="0"/>
                 <a:cs typeface="Arial" panose="020B0604020202020204" pitchFamily="34" charset="0"/>
               </a:rPr>
-              <a:t>create</a:t>
+              <a:t>array</a:t>
             </a:r>
             <a:r>
               <a:rPr lang="de-CH" sz="1000" b="1" dirty="0">
@@ -8159,7 +8159,87 @@
                 <a:latin typeface="Arial" panose="020B0604020202020204" pitchFamily="34" charset="0"/>
                 <a:cs typeface="Arial" panose="020B0604020202020204" pitchFamily="34" charset="0"/>
               </a:rPr>
-              <a:t>array</a:t>
+              <a:t>defining</a:t>
+            </a:r>
+            <a:r>
+              <a:rPr lang="de-CH" sz="1000" b="1" dirty="0">
+                <a:solidFill>
+                  <a:schemeClr val="tx1"/>
+                </a:solidFill>
+                <a:latin typeface="Arial" panose="020B0604020202020204" pitchFamily="34" charset="0"/>
+                <a:cs typeface="Arial" panose="020B0604020202020204" pitchFamily="34" charset="0"/>
+              </a:rPr>
+              <a:t> </a:t>
+            </a:r>
+            <a:r>
+              <a:rPr lang="de-CH" sz="1000" b="1" dirty="0" err="1">
+                <a:solidFill>
+                  <a:schemeClr val="tx1"/>
+                </a:solidFill>
+                <a:latin typeface="Arial" panose="020B0604020202020204" pitchFamily="34" charset="0"/>
+                <a:cs typeface="Arial" panose="020B0604020202020204" pitchFamily="34" charset="0"/>
+              </a:rPr>
+              <a:t>files</a:t>
+            </a:r>
+            <a:r>
+              <a:rPr lang="de-CH" sz="1000" b="1" dirty="0">
+                <a:solidFill>
+                  <a:schemeClr val="tx1"/>
+                </a:solidFill>
+                <a:latin typeface="Arial" panose="020B0604020202020204" pitchFamily="34" charset="0"/>
+                <a:cs typeface="Arial" panose="020B0604020202020204" pitchFamily="34" charset="0"/>
+              </a:rPr>
+              <a:t> </a:t>
+            </a:r>
+            <a:r>
+              <a:rPr lang="de-CH" sz="1000" b="1" dirty="0" err="1">
+                <a:solidFill>
+                  <a:schemeClr val="tx1"/>
+                </a:solidFill>
+                <a:latin typeface="Arial" panose="020B0604020202020204" pitchFamily="34" charset="0"/>
+                <a:cs typeface="Arial" panose="020B0604020202020204" pitchFamily="34" charset="0"/>
+              </a:rPr>
+              <a:t>to</a:t>
+            </a:r>
+            <a:r>
+              <a:rPr lang="de-CH" sz="1000" b="1" dirty="0">
+                <a:solidFill>
+                  <a:schemeClr val="tx1"/>
+                </a:solidFill>
+                <a:latin typeface="Arial" panose="020B0604020202020204" pitchFamily="34" charset="0"/>
+                <a:cs typeface="Arial" panose="020B0604020202020204" pitchFamily="34" charset="0"/>
+              </a:rPr>
+              <a:t> </a:t>
+            </a:r>
+            <a:r>
+              <a:rPr lang="de-CH" sz="1000" b="1" dirty="0" err="1">
+                <a:solidFill>
+                  <a:schemeClr val="tx1"/>
+                </a:solidFill>
+                <a:latin typeface="Arial" panose="020B0604020202020204" pitchFamily="34" charset="0"/>
+                <a:cs typeface="Arial" panose="020B0604020202020204" pitchFamily="34" charset="0"/>
+              </a:rPr>
+              <a:t>be</a:t>
+            </a:r>
+            <a:r>
+              <a:rPr lang="de-CH" sz="1000" b="1" dirty="0">
+                <a:solidFill>
+                  <a:schemeClr val="tx1"/>
+                </a:solidFill>
+                <a:latin typeface="Arial" panose="020B0604020202020204" pitchFamily="34" charset="0"/>
+                <a:cs typeface="Arial" panose="020B0604020202020204" pitchFamily="34" charset="0"/>
+              </a:rPr>
+              <a:t> registered and </a:t>
+            </a:r>
+            <a:r>
+              <a:rPr lang="de-CH" sz="1000" b="1" dirty="0" err="1">
+                <a:solidFill>
+                  <a:schemeClr val="tx1"/>
+                </a:solidFill>
+                <a:latin typeface="Arial" panose="020B0604020202020204" pitchFamily="34" charset="0"/>
+                <a:cs typeface="Arial" panose="020B0604020202020204" pitchFamily="34" charset="0"/>
+              </a:rPr>
+              <a:t>uploaded</a:t>
             </a:r>
             <a:endParaRPr lang="de-CH" sz="1000" b="1" dirty="0">
               <a:solidFill>
@@ -8187,7 +8267,7 @@
         </p:nvCxnSpPr>
         <p:spPr>
           <a:xfrm flipV="1">
-            <a:off x="3303479" y="3523347"/>
+            <a:off x="3303479" y="3087119"/>
             <a:ext cx="0" cy="154303"/>
           </a:xfrm>
           <a:prstGeom prst="line">
@@ -8228,8 +8308,8 @@
         </p:nvSpPr>
         <p:spPr>
           <a:xfrm>
-            <a:off x="1261872" y="4209842"/>
-            <a:ext cx="4200143" cy="805848"/>
+            <a:off x="1261872" y="3773613"/>
+            <a:ext cx="4341974" cy="1220007"/>
           </a:xfrm>
           <a:prstGeom prst="rect">
             <a:avLst/>
@@ -8363,7 +8443,7 @@
                 <a:latin typeface="Arial" panose="020B0604020202020204" pitchFamily="34" charset="0"/>
                 <a:cs typeface="Arial" panose="020B0604020202020204" pitchFamily="34" charset="0"/>
               </a:rPr>
-              <a:t>setDataOfAppendedQrFilesNodeAndUpload</a:t>
+              <a:t>setDataOfAppendedQrFilesNodeAndUploadSupporter</a:t>
             </a:r>
             <a:r>
               <a:rPr lang="en-US" sz="1000" b="1" dirty="0">
@@ -8384,6 +8464,155 @@
                 <a:cs typeface="Arial" panose="020B0604020202020204" pitchFamily="34" charset="0"/>
               </a:rPr>
               <a:t>SupportData</a:t>
+            </a:r>
+            <a:r>
+              <a:rPr lang="en-US" sz="1000" b="1" dirty="0">
+                <a:solidFill>
+                  <a:schemeClr val="tx1"/>
+                </a:solidFill>
+                <a:latin typeface="Arial" panose="020B0604020202020204" pitchFamily="34" charset="0"/>
+                <a:cs typeface="Arial" panose="020B0604020202020204" pitchFamily="34" charset="0"/>
+              </a:rPr>
+              <a:t>)</a:t>
+            </a:r>
+          </a:p>
+          <a:p>
+            <a:pPr algn="ctr"/>
+            <a:r>
+              <a:rPr lang="en-US" sz="1000" b="1" dirty="0" err="1">
+                <a:solidFill>
+                  <a:schemeClr val="tx1"/>
+                </a:solidFill>
+                <a:latin typeface="Arial" panose="020B0604020202020204" pitchFamily="34" charset="0"/>
+                <a:cs typeface="Arial" panose="020B0604020202020204" pitchFamily="34" charset="0"/>
+              </a:rPr>
+              <a:t>uploadQrFileImageAndTextSupporter</a:t>
+            </a:r>
+            <a:r>
+              <a:rPr lang="en-US" sz="1000" b="1" dirty="0">
+                <a:solidFill>
+                  <a:schemeClr val="tx1"/>
+                </a:solidFill>
+                <a:latin typeface="Arial" panose="020B0604020202020204" pitchFamily="34" charset="0"/>
+                <a:cs typeface="Arial" panose="020B0604020202020204" pitchFamily="34" charset="0"/>
+              </a:rPr>
+              <a:t>((</a:t>
+            </a:r>
+            <a:r>
+              <a:rPr lang="en-US" sz="1000" b="1" dirty="0" err="1">
+                <a:solidFill>
+                  <a:schemeClr val="tx1"/>
+                </a:solidFill>
+                <a:latin typeface="Arial" panose="020B0604020202020204" pitchFamily="34" charset="0"/>
+                <a:cs typeface="Arial" panose="020B0604020202020204" pitchFamily="34" charset="0"/>
+              </a:rPr>
+              <a:t>file_number</a:t>
+            </a:r>
+            <a:r>
+              <a:rPr lang="en-US" sz="1000" b="1" dirty="0">
+                <a:solidFill>
+                  <a:schemeClr val="tx1"/>
+                </a:solidFill>
+                <a:latin typeface="Arial" panose="020B0604020202020204" pitchFamily="34" charset="0"/>
+                <a:cs typeface="Arial" panose="020B0604020202020204" pitchFamily="34" charset="0"/>
+              </a:rPr>
+              <a:t>, </a:t>
+            </a:r>
+            <a:r>
+              <a:rPr lang="en-US" sz="1000" b="1" dirty="0" err="1">
+                <a:solidFill>
+                  <a:schemeClr val="tx1"/>
+                </a:solidFill>
+                <a:latin typeface="Arial" panose="020B0604020202020204" pitchFamily="34" charset="0"/>
+                <a:cs typeface="Arial" panose="020B0604020202020204" pitchFamily="34" charset="0"/>
+              </a:rPr>
+              <a:t>qr_xml</a:t>
+            </a:r>
+            <a:r>
+              <a:rPr lang="en-US" sz="1000" b="1" dirty="0">
+                <a:solidFill>
+                  <a:schemeClr val="tx1"/>
+                </a:solidFill>
+                <a:latin typeface="Arial" panose="020B0604020202020204" pitchFamily="34" charset="0"/>
+                <a:cs typeface="Arial" panose="020B0604020202020204" pitchFamily="34" charset="0"/>
+              </a:rPr>
+              <a:t>)</a:t>
+            </a:r>
+          </a:p>
+          <a:p>
+            <a:pPr algn="ctr"/>
+            <a:r>
+              <a:rPr lang="en-US" sz="1000" b="1" dirty="0" err="1">
+                <a:solidFill>
+                  <a:schemeClr val="tx1"/>
+                </a:solidFill>
+                <a:latin typeface="Arial" panose="020B0604020202020204" pitchFamily="34" charset="0"/>
+                <a:cs typeface="Arial" panose="020B0604020202020204" pitchFamily="34" charset="0"/>
+              </a:rPr>
+              <a:t>generateQrCodeOnePersonDataUrl</a:t>
+            </a:r>
+            <a:r>
+              <a:rPr lang="en-US" sz="1000" b="1" dirty="0">
+                <a:solidFill>
+                  <a:schemeClr val="tx1"/>
+                </a:solidFill>
+                <a:latin typeface="Arial" panose="020B0604020202020204" pitchFamily="34" charset="0"/>
+                <a:cs typeface="Arial" panose="020B0604020202020204" pitchFamily="34" charset="0"/>
+              </a:rPr>
+              <a:t>(</a:t>
+            </a:r>
+            <a:r>
+              <a:rPr lang="en-US" sz="1000" b="1" dirty="0" err="1">
+                <a:solidFill>
+                  <a:schemeClr val="tx1"/>
+                </a:solidFill>
+                <a:latin typeface="Arial" panose="020B0604020202020204" pitchFamily="34" charset="0"/>
+                <a:cs typeface="Arial" panose="020B0604020202020204" pitchFamily="34" charset="0"/>
+              </a:rPr>
+              <a:t>qr_text</a:t>
+            </a:r>
+            <a:r>
+              <a:rPr lang="en-US" sz="1000" b="1" dirty="0">
+                <a:solidFill>
+                  <a:schemeClr val="tx1"/>
+                </a:solidFill>
+                <a:latin typeface="Arial" panose="020B0604020202020204" pitchFamily="34" charset="0"/>
+                <a:cs typeface="Arial" panose="020B0604020202020204" pitchFamily="34" charset="0"/>
+              </a:rPr>
+              <a:t>)</a:t>
+            </a:r>
+          </a:p>
+          <a:p>
+            <a:pPr algn="ctr"/>
+            <a:r>
+              <a:rPr lang="en-US" sz="1000" b="1" dirty="0" err="1">
+                <a:solidFill>
+                  <a:schemeClr val="tx1"/>
+                </a:solidFill>
+                <a:latin typeface="Arial" panose="020B0604020202020204" pitchFamily="34" charset="0"/>
+                <a:cs typeface="Arial" panose="020B0604020202020204" pitchFamily="34" charset="0"/>
+              </a:rPr>
+              <a:t>saveFileWithJQueryPostFunction</a:t>
+            </a:r>
+            <a:r>
+              <a:rPr lang="en-US" sz="1000" b="1" dirty="0">
+                <a:solidFill>
+                  <a:schemeClr val="tx1"/>
+                </a:solidFill>
+                <a:latin typeface="Arial" panose="020B0604020202020204" pitchFamily="34" charset="0"/>
+                <a:cs typeface="Arial" panose="020B0604020202020204" pitchFamily="34" charset="0"/>
+              </a:rPr>
+              <a:t>(</a:t>
+            </a:r>
+            <a:r>
+              <a:rPr lang="en-US" sz="1000" b="1" i="1" dirty="0">
+                <a:solidFill>
+                  <a:schemeClr val="tx1"/>
+                </a:solidFill>
+                <a:latin typeface="Arial" panose="020B0604020202020204" pitchFamily="34" charset="0"/>
+                <a:cs typeface="Arial" panose="020B0604020202020204" pitchFamily="34" charset="0"/>
+              </a:rPr>
+              <a:t>path, content</a:t>
             </a:r>
             <a:r>
               <a:rPr lang="en-US" sz="1000" b="1" dirty="0">
@@ -8444,7 +8673,7 @@
         </p:nvCxnSpPr>
         <p:spPr>
           <a:xfrm flipV="1">
-            <a:off x="3293608" y="5015375"/>
+            <a:off x="3293608" y="4990208"/>
             <a:ext cx="0" cy="154303"/>
           </a:xfrm>
           <a:prstGeom prst="line">
@@ -8485,8 +8714,8 @@
         </p:nvSpPr>
         <p:spPr>
           <a:xfrm>
-            <a:off x="1240130" y="5159888"/>
-            <a:ext cx="4200143" cy="273141"/>
+            <a:off x="1240130" y="5134721"/>
+            <a:ext cx="4341974" cy="273141"/>
           </a:xfrm>
           <a:prstGeom prst="rect">
             <a:avLst/>
@@ -8565,7 +8794,7 @@
         </p:nvCxnSpPr>
         <p:spPr>
           <a:xfrm flipV="1">
-            <a:off x="3289280" y="5433029"/>
+            <a:off x="3289280" y="5407862"/>
             <a:ext cx="0" cy="154303"/>
           </a:xfrm>
           <a:prstGeom prst="line">
@@ -8608,7 +8837,7 @@
         </p:nvCxnSpPr>
         <p:spPr>
           <a:xfrm flipV="1">
-            <a:off x="8354501" y="1114216"/>
+            <a:off x="8992065" y="1114216"/>
             <a:ext cx="0" cy="154303"/>
           </a:xfrm>
           <a:prstGeom prst="line">
@@ -8649,7 +8878,7 @@
         </p:nvSpPr>
         <p:spPr>
           <a:xfrm>
-            <a:off x="437596" y="5169678"/>
+            <a:off x="446882" y="5144511"/>
             <a:ext cx="1025444" cy="215444"/>
           </a:xfrm>
           <a:prstGeom prst="rect">
@@ -8687,7 +8916,7 @@
         </p:nvSpPr>
         <p:spPr>
           <a:xfrm>
-            <a:off x="636203" y="5615523"/>
+            <a:off x="384533" y="5590356"/>
             <a:ext cx="1025444" cy="215444"/>
           </a:xfrm>
           <a:prstGeom prst="rect">
@@ -8706,7 +8935,7 @@
                 <a:latin typeface="Arial" panose="020B0604020202020204" pitchFamily="34" charset="0"/>
                 <a:cs typeface="Arial" panose="020B0604020202020204" pitchFamily="34" charset="0"/>
               </a:rPr>
-              <a:t>QrFiles.js</a:t>
+              <a:t>QrCodeFiles.js</a:t>
             </a:r>
           </a:p>
         </p:txBody>
@@ -8725,7 +8954,7 @@
         </p:nvSpPr>
         <p:spPr>
           <a:xfrm>
-            <a:off x="624011" y="6025724"/>
+            <a:off x="372341" y="6000557"/>
             <a:ext cx="1025444" cy="215444"/>
           </a:xfrm>
           <a:prstGeom prst="rect">
@@ -8744,7 +8973,7 @@
                 <a:latin typeface="Arial" panose="020B0604020202020204" pitchFamily="34" charset="0"/>
                 <a:cs typeface="Arial" panose="020B0604020202020204" pitchFamily="34" charset="0"/>
               </a:rPr>
-              <a:t>QrFiles.js</a:t>
+              <a:t>QrCodeFiles.js</a:t>
             </a:r>
           </a:p>
         </p:txBody>
@@ -8763,7 +8992,7 @@
         </p:nvSpPr>
         <p:spPr>
           <a:xfrm>
-            <a:off x="636203" y="706389"/>
+            <a:off x="636203" y="270161"/>
             <a:ext cx="1025444" cy="338554"/>
           </a:xfrm>
           <a:prstGeom prst="rect">
@@ -8810,7 +9039,7 @@
         </p:nvSpPr>
         <p:spPr>
           <a:xfrm>
-            <a:off x="647737" y="1318359"/>
+            <a:off x="396067" y="882131"/>
             <a:ext cx="1025444" cy="215444"/>
           </a:xfrm>
           <a:prstGeom prst="rect">
@@ -8829,7 +9058,7 @@
                 <a:latin typeface="Arial" panose="020B0604020202020204" pitchFamily="34" charset="0"/>
                 <a:cs typeface="Arial" panose="020B0604020202020204" pitchFamily="34" charset="0"/>
               </a:rPr>
-              <a:t>QrFiles.js</a:t>
+              <a:t>QrCodeFiles.js</a:t>
             </a:r>
           </a:p>
         </p:txBody>
@@ -8848,8 +9077,8 @@
         </p:nvSpPr>
         <p:spPr>
           <a:xfrm>
-            <a:off x="297524" y="4406341"/>
-            <a:ext cx="1025444" cy="461665"/>
+            <a:off x="142613" y="3944946"/>
+            <a:ext cx="1180355" cy="461665"/>
           </a:xfrm>
           <a:prstGeom prst="rect">
             <a:avLst/>
@@ -8885,7 +9114,7 @@
                 <a:latin typeface="Arial" panose="020B0604020202020204" pitchFamily="34" charset="0"/>
                 <a:cs typeface="Arial" panose="020B0604020202020204" pitchFamily="34" charset="0"/>
               </a:rPr>
-              <a:t>QrFilesXml,js</a:t>
+              <a:t>QrCodeFilesXml,js</a:t>
             </a:r>
             <a:endParaRPr lang="de-CH" sz="800" b="1" dirty="0">
               <a:latin typeface="Arial" panose="020B0604020202020204" pitchFamily="34" charset="0"/>
@@ -8908,7 +9137,7 @@
         </p:nvSpPr>
         <p:spPr>
           <a:xfrm>
-            <a:off x="10466743" y="1416074"/>
+            <a:off x="6045740" y="1416074"/>
             <a:ext cx="1025444" cy="215444"/>
           </a:xfrm>
           <a:prstGeom prst="rect">
@@ -8946,8 +9175,8 @@
         </p:nvSpPr>
         <p:spPr>
           <a:xfrm>
-            <a:off x="1261872" y="3226823"/>
-            <a:ext cx="4200143" cy="292900"/>
+            <a:off x="1261872" y="2790595"/>
+            <a:ext cx="4341974" cy="292900"/>
           </a:xfrm>
           <a:prstGeom prst="rect">
             <a:avLst/>
@@ -9059,7 +9288,7 @@
         </p:nvCxnSpPr>
         <p:spPr>
           <a:xfrm flipV="1">
-            <a:off x="3303402" y="3064719"/>
+            <a:off x="3303402" y="2628491"/>
             <a:ext cx="0" cy="154303"/>
           </a:xfrm>
           <a:prstGeom prst="line">
@@ -9100,7 +9329,7 @@
         </p:nvSpPr>
         <p:spPr>
           <a:xfrm>
-            <a:off x="10487762" y="1918209"/>
+            <a:off x="6066759" y="1918209"/>
             <a:ext cx="1025444" cy="215444"/>
           </a:xfrm>
           <a:prstGeom prst="rect">
@@ -9138,7 +9367,7 @@
         </p:nvSpPr>
         <p:spPr>
           <a:xfrm>
-            <a:off x="10514760" y="2312055"/>
+            <a:off x="6066759" y="2323802"/>
             <a:ext cx="1025444" cy="215444"/>
           </a:xfrm>
           <a:prstGeom prst="rect">
@@ -9178,7 +9407,7 @@
         </p:nvCxnSpPr>
         <p:spPr>
           <a:xfrm flipV="1">
-            <a:off x="8360054" y="2575092"/>
+            <a:off x="8997618" y="2575092"/>
             <a:ext cx="0" cy="154303"/>
           </a:xfrm>
           <a:prstGeom prst="line">
@@ -9219,8 +9448,8 @@
         </p:nvSpPr>
         <p:spPr>
           <a:xfrm>
-            <a:off x="6287618" y="2729395"/>
-            <a:ext cx="4200143" cy="377119"/>
+            <a:off x="6925182" y="2729395"/>
+            <a:ext cx="4341974" cy="377119"/>
           </a:xfrm>
           <a:prstGeom prst="rect">
             <a:avLst/>
@@ -9392,7 +9621,7 @@
         </p:nvCxnSpPr>
         <p:spPr>
           <a:xfrm flipV="1">
-            <a:off x="8370379" y="3098115"/>
+            <a:off x="9007943" y="3098115"/>
             <a:ext cx="0" cy="154303"/>
           </a:xfrm>
           <a:prstGeom prst="line">
@@ -9433,8 +9662,8 @@
         </p:nvSpPr>
         <p:spPr>
           <a:xfrm>
-            <a:off x="6289392" y="3243139"/>
-            <a:ext cx="4200143" cy="805848"/>
+            <a:off x="6926956" y="3243139"/>
+            <a:ext cx="4341974" cy="1267630"/>
           </a:xfrm>
           <a:prstGeom prst="rect">
             <a:avLst/>
@@ -9475,7 +9704,7 @@
                 <a:latin typeface="Arial" panose="020B0604020202020204" pitchFamily="34" charset="0"/>
                 <a:cs typeface="Arial" panose="020B0604020202020204" pitchFamily="34" charset="0"/>
               </a:rPr>
-              <a:t>registerAndUploadQrFilesXmlConcert</a:t>
+              <a:t>registerAndUploadQrFilesXmlMusician</a:t>
             </a:r>
             <a:r>
               <a:rPr lang="en-US" sz="1000" b="1" dirty="0">
@@ -9568,7 +9797,7 @@
                 <a:latin typeface="Arial" panose="020B0604020202020204" pitchFamily="34" charset="0"/>
                 <a:cs typeface="Arial" panose="020B0604020202020204" pitchFamily="34" charset="0"/>
               </a:rPr>
-              <a:t>setDataOfAppendedQrFilesNodeAndUploadConcert</a:t>
+              <a:t>setDataOfAppendedQrFilesNodeAndUploadMusician</a:t>
             </a:r>
             <a:r>
               <a:rPr lang="en-US" sz="1000" b="1" dirty="0">
@@ -9589,6 +9818,155 @@
                 <a:cs typeface="Arial" panose="020B0604020202020204" pitchFamily="34" charset="0"/>
               </a:rPr>
               <a:t>ConcertData</a:t>
+            </a:r>
+            <a:r>
+              <a:rPr lang="en-US" sz="1000" b="1" dirty="0">
+                <a:solidFill>
+                  <a:schemeClr val="tx1"/>
+                </a:solidFill>
+                <a:latin typeface="Arial" panose="020B0604020202020204" pitchFamily="34" charset="0"/>
+                <a:cs typeface="Arial" panose="020B0604020202020204" pitchFamily="34" charset="0"/>
+              </a:rPr>
+              <a:t>)</a:t>
+            </a:r>
+          </a:p>
+          <a:p>
+            <a:pPr algn="ctr"/>
+            <a:r>
+              <a:rPr lang="en-US" sz="1000" b="1" dirty="0" err="1">
+                <a:solidFill>
+                  <a:schemeClr val="tx1"/>
+                </a:solidFill>
+                <a:latin typeface="Arial" panose="020B0604020202020204" pitchFamily="34" charset="0"/>
+                <a:cs typeface="Arial" panose="020B0604020202020204" pitchFamily="34" charset="0"/>
+              </a:rPr>
+              <a:t>uploadQrFileImageAndTextMusician</a:t>
+            </a:r>
+            <a:r>
+              <a:rPr lang="en-US" sz="1000" b="1" dirty="0">
+                <a:solidFill>
+                  <a:schemeClr val="tx1"/>
+                </a:solidFill>
+                <a:latin typeface="Arial" panose="020B0604020202020204" pitchFamily="34" charset="0"/>
+                <a:cs typeface="Arial" panose="020B0604020202020204" pitchFamily="34" charset="0"/>
+              </a:rPr>
+              <a:t>((</a:t>
+            </a:r>
+            <a:r>
+              <a:rPr lang="en-US" sz="1000" b="1" dirty="0" err="1">
+                <a:solidFill>
+                  <a:schemeClr val="tx1"/>
+                </a:solidFill>
+                <a:latin typeface="Arial" panose="020B0604020202020204" pitchFamily="34" charset="0"/>
+                <a:cs typeface="Arial" panose="020B0604020202020204" pitchFamily="34" charset="0"/>
+              </a:rPr>
+              <a:t>file_number</a:t>
+            </a:r>
+            <a:r>
+              <a:rPr lang="en-US" sz="1000" b="1" dirty="0">
+                <a:solidFill>
+                  <a:schemeClr val="tx1"/>
+                </a:solidFill>
+                <a:latin typeface="Arial" panose="020B0604020202020204" pitchFamily="34" charset="0"/>
+                <a:cs typeface="Arial" panose="020B0604020202020204" pitchFamily="34" charset="0"/>
+              </a:rPr>
+              <a:t>, </a:t>
+            </a:r>
+            <a:r>
+              <a:rPr lang="en-US" sz="1000" b="1" dirty="0" err="1">
+                <a:solidFill>
+                  <a:schemeClr val="tx1"/>
+                </a:solidFill>
+                <a:latin typeface="Arial" panose="020B0604020202020204" pitchFamily="34" charset="0"/>
+                <a:cs typeface="Arial" panose="020B0604020202020204" pitchFamily="34" charset="0"/>
+              </a:rPr>
+              <a:t>qr_xml</a:t>
+            </a:r>
+            <a:r>
+              <a:rPr lang="en-US" sz="1000" b="1" dirty="0">
+                <a:solidFill>
+                  <a:schemeClr val="tx1"/>
+                </a:solidFill>
+                <a:latin typeface="Arial" panose="020B0604020202020204" pitchFamily="34" charset="0"/>
+                <a:cs typeface="Arial" panose="020B0604020202020204" pitchFamily="34" charset="0"/>
+              </a:rPr>
+              <a:t>)</a:t>
+            </a:r>
+          </a:p>
+          <a:p>
+            <a:pPr algn="ctr"/>
+            <a:r>
+              <a:rPr lang="en-US" sz="1000" b="1" dirty="0" err="1">
+                <a:solidFill>
+                  <a:schemeClr val="tx1"/>
+                </a:solidFill>
+                <a:latin typeface="Arial" panose="020B0604020202020204" pitchFamily="34" charset="0"/>
+                <a:cs typeface="Arial" panose="020B0604020202020204" pitchFamily="34" charset="0"/>
+              </a:rPr>
+              <a:t>generateQrCodeOnePersonDataUrl</a:t>
+            </a:r>
+            <a:r>
+              <a:rPr lang="en-US" sz="1000" b="1" dirty="0">
+                <a:solidFill>
+                  <a:schemeClr val="tx1"/>
+                </a:solidFill>
+                <a:latin typeface="Arial" panose="020B0604020202020204" pitchFamily="34" charset="0"/>
+                <a:cs typeface="Arial" panose="020B0604020202020204" pitchFamily="34" charset="0"/>
+              </a:rPr>
+              <a:t>(</a:t>
+            </a:r>
+            <a:r>
+              <a:rPr lang="en-US" sz="1000" b="1" dirty="0" err="1">
+                <a:solidFill>
+                  <a:schemeClr val="tx1"/>
+                </a:solidFill>
+                <a:latin typeface="Arial" panose="020B0604020202020204" pitchFamily="34" charset="0"/>
+                <a:cs typeface="Arial" panose="020B0604020202020204" pitchFamily="34" charset="0"/>
+              </a:rPr>
+              <a:t>qr_text</a:t>
+            </a:r>
+            <a:r>
+              <a:rPr lang="en-US" sz="1000" b="1" dirty="0">
+                <a:solidFill>
+                  <a:schemeClr val="tx1"/>
+                </a:solidFill>
+                <a:latin typeface="Arial" panose="020B0604020202020204" pitchFamily="34" charset="0"/>
+                <a:cs typeface="Arial" panose="020B0604020202020204" pitchFamily="34" charset="0"/>
+              </a:rPr>
+              <a:t>)</a:t>
+            </a:r>
+          </a:p>
+          <a:p>
+            <a:pPr algn="ctr"/>
+            <a:r>
+              <a:rPr lang="en-US" sz="1000" b="1" dirty="0" err="1">
+                <a:solidFill>
+                  <a:schemeClr val="tx1"/>
+                </a:solidFill>
+                <a:latin typeface="Arial" panose="020B0604020202020204" pitchFamily="34" charset="0"/>
+                <a:cs typeface="Arial" panose="020B0604020202020204" pitchFamily="34" charset="0"/>
+              </a:rPr>
+              <a:t>saveFileWithJQueryPostFunction</a:t>
+            </a:r>
+            <a:r>
+              <a:rPr lang="en-US" sz="1000" b="1" dirty="0">
+                <a:solidFill>
+                  <a:schemeClr val="tx1"/>
+                </a:solidFill>
+                <a:latin typeface="Arial" panose="020B0604020202020204" pitchFamily="34" charset="0"/>
+                <a:cs typeface="Arial" panose="020B0604020202020204" pitchFamily="34" charset="0"/>
+              </a:rPr>
+              <a:t>(</a:t>
+            </a:r>
+            <a:r>
+              <a:rPr lang="en-US" sz="1000" b="1" i="1" dirty="0">
+                <a:solidFill>
+                  <a:schemeClr val="tx1"/>
+                </a:solidFill>
+                <a:latin typeface="Arial" panose="020B0604020202020204" pitchFamily="34" charset="0"/>
+                <a:cs typeface="Arial" panose="020B0604020202020204" pitchFamily="34" charset="0"/>
+              </a:rPr>
+              <a:t>path, content</a:t>
             </a:r>
             <a:r>
               <a:rPr lang="en-US" sz="1000" b="1" dirty="0">
@@ -9649,7 +10027,7 @@
         </p:nvCxnSpPr>
         <p:spPr>
           <a:xfrm flipV="1">
-            <a:off x="8366693" y="4048987"/>
+            <a:off x="9004257" y="4510382"/>
             <a:ext cx="0" cy="154303"/>
           </a:xfrm>
           <a:prstGeom prst="line">
@@ -9676,6 +10054,256 @@
           </a:fontRef>
         </p:style>
       </p:cxnSp>
+      <p:sp>
+        <p:nvSpPr>
+          <p:cNvPr id="46" name="Textfeld 45">
+            <a:extLst>
+              <a:ext uri="{FF2B5EF4-FFF2-40B4-BE49-F238E27FC236}">
+                <a16:creationId xmlns:a16="http://schemas.microsoft.com/office/drawing/2014/main" id="{FD93EFBA-73C3-88D4-4DF7-3A57B9513CAE}"/>
+              </a:ext>
+            </a:extLst>
+          </p:cNvPr>
+          <p:cNvSpPr txBox="1"/>
+          <p:nvPr/>
+        </p:nvSpPr>
+        <p:spPr>
+          <a:xfrm>
+            <a:off x="236428" y="3243139"/>
+            <a:ext cx="1025444" cy="215444"/>
+          </a:xfrm>
+          <a:prstGeom prst="rect">
+            <a:avLst/>
+          </a:prstGeom>
+          <a:noFill/>
+        </p:spPr>
+        <p:txBody>
+          <a:bodyPr wrap="square" rtlCol="0">
+            <a:spAutoFit/>
+          </a:bodyPr>
+          <a:lstStyle/>
+          <a:p>
+            <a:r>
+              <a:rPr lang="de-CH" sz="800" b="1" dirty="0">
+                <a:latin typeface="Arial" panose="020B0604020202020204" pitchFamily="34" charset="0"/>
+                <a:cs typeface="Arial" panose="020B0604020202020204" pitchFamily="34" charset="0"/>
+              </a:rPr>
+              <a:t>SupporterData.js</a:t>
+            </a:r>
+          </a:p>
+        </p:txBody>
+      </p:sp>
+      <p:sp>
+        <p:nvSpPr>
+          <p:cNvPr id="47" name="Textfeld 46">
+            <a:extLst>
+              <a:ext uri="{FF2B5EF4-FFF2-40B4-BE49-F238E27FC236}">
+                <a16:creationId xmlns:a16="http://schemas.microsoft.com/office/drawing/2014/main" id="{3E5162A3-FD5D-F62F-6291-7157AA935AFE}"/>
+              </a:ext>
+            </a:extLst>
+          </p:cNvPr>
+          <p:cNvSpPr txBox="1"/>
+          <p:nvPr/>
+        </p:nvSpPr>
+        <p:spPr>
+          <a:xfrm>
+            <a:off x="372341" y="2367588"/>
+            <a:ext cx="1025444" cy="215444"/>
+          </a:xfrm>
+          <a:prstGeom prst="rect">
+            <a:avLst/>
+          </a:prstGeom>
+          <a:noFill/>
+        </p:spPr>
+        <p:txBody>
+          <a:bodyPr wrap="square" rtlCol="0">
+            <a:spAutoFit/>
+          </a:bodyPr>
+          <a:lstStyle/>
+          <a:p>
+            <a:r>
+              <a:rPr lang="de-CH" sz="800" b="1" dirty="0">
+                <a:latin typeface="Arial" panose="020B0604020202020204" pitchFamily="34" charset="0"/>
+                <a:cs typeface="Arial" panose="020B0604020202020204" pitchFamily="34" charset="0"/>
+              </a:rPr>
+              <a:t>QrCodeFiles.js</a:t>
+            </a:r>
+          </a:p>
+        </p:txBody>
+      </p:sp>
+      <p:sp>
+        <p:nvSpPr>
+          <p:cNvPr id="48" name="Textfeld 47">
+            <a:extLst>
+              <a:ext uri="{FF2B5EF4-FFF2-40B4-BE49-F238E27FC236}">
+                <a16:creationId xmlns:a16="http://schemas.microsoft.com/office/drawing/2014/main" id="{2A0DD84F-7B7F-CDF2-67DD-256B0BD07716}"/>
+              </a:ext>
+            </a:extLst>
+          </p:cNvPr>
+          <p:cNvSpPr txBox="1"/>
+          <p:nvPr/>
+        </p:nvSpPr>
+        <p:spPr>
+          <a:xfrm>
+            <a:off x="383678" y="1872432"/>
+            <a:ext cx="1025444" cy="215444"/>
+          </a:xfrm>
+          <a:prstGeom prst="rect">
+            <a:avLst/>
+          </a:prstGeom>
+          <a:noFill/>
+        </p:spPr>
+        <p:txBody>
+          <a:bodyPr wrap="square" rtlCol="0">
+            <a:spAutoFit/>
+          </a:bodyPr>
+          <a:lstStyle/>
+          <a:p>
+            <a:r>
+              <a:rPr lang="de-CH" sz="800" b="1" dirty="0">
+                <a:latin typeface="Arial" panose="020B0604020202020204" pitchFamily="34" charset="0"/>
+                <a:cs typeface="Arial" panose="020B0604020202020204" pitchFamily="34" charset="0"/>
+              </a:rPr>
+              <a:t>QrCodeFiles.js</a:t>
+            </a:r>
+          </a:p>
+        </p:txBody>
+      </p:sp>
+      <p:sp>
+        <p:nvSpPr>
+          <p:cNvPr id="49" name="Textfeld 48">
+            <a:extLst>
+              <a:ext uri="{FF2B5EF4-FFF2-40B4-BE49-F238E27FC236}">
+                <a16:creationId xmlns:a16="http://schemas.microsoft.com/office/drawing/2014/main" id="{C1E0871D-4B5F-D999-CE7A-CE399123765D}"/>
+              </a:ext>
+            </a:extLst>
+          </p:cNvPr>
+          <p:cNvSpPr txBox="1"/>
+          <p:nvPr/>
+        </p:nvSpPr>
+        <p:spPr>
+          <a:xfrm>
+            <a:off x="401728" y="1394082"/>
+            <a:ext cx="1025444" cy="215444"/>
+          </a:xfrm>
+          <a:prstGeom prst="rect">
+            <a:avLst/>
+          </a:prstGeom>
+          <a:noFill/>
+        </p:spPr>
+        <p:txBody>
+          <a:bodyPr wrap="square" rtlCol="0">
+            <a:spAutoFit/>
+          </a:bodyPr>
+          <a:lstStyle/>
+          <a:p>
+            <a:r>
+              <a:rPr lang="de-CH" sz="800" b="1" dirty="0">
+                <a:latin typeface="Arial" panose="020B0604020202020204" pitchFamily="34" charset="0"/>
+                <a:cs typeface="Arial" panose="020B0604020202020204" pitchFamily="34" charset="0"/>
+              </a:rPr>
+              <a:t>QrCodeFiles.js</a:t>
+            </a:r>
+          </a:p>
+        </p:txBody>
+      </p:sp>
+      <p:sp>
+        <p:nvSpPr>
+          <p:cNvPr id="50" name="Textfeld 49">
+            <a:extLst>
+              <a:ext uri="{FF2B5EF4-FFF2-40B4-BE49-F238E27FC236}">
+                <a16:creationId xmlns:a16="http://schemas.microsoft.com/office/drawing/2014/main" id="{9B85AAA8-68D2-E72A-AC56-C5C05C6DDC16}"/>
+              </a:ext>
+            </a:extLst>
+          </p:cNvPr>
+          <p:cNvSpPr txBox="1"/>
+          <p:nvPr/>
+        </p:nvSpPr>
+        <p:spPr>
+          <a:xfrm>
+            <a:off x="6075434" y="2810232"/>
+            <a:ext cx="1025444" cy="215444"/>
+          </a:xfrm>
+          <a:prstGeom prst="rect">
+            <a:avLst/>
+          </a:prstGeom>
+          <a:noFill/>
+        </p:spPr>
+        <p:txBody>
+          <a:bodyPr wrap="square" rtlCol="0">
+            <a:spAutoFit/>
+          </a:bodyPr>
+          <a:lstStyle/>
+          <a:p>
+            <a:r>
+              <a:rPr lang="de-CH" sz="800" b="1" dirty="0">
+                <a:latin typeface="Arial" panose="020B0604020202020204" pitchFamily="34" charset="0"/>
+                <a:cs typeface="Arial" panose="020B0604020202020204" pitchFamily="34" charset="0"/>
+              </a:rPr>
+              <a:t>ConcertData.js</a:t>
+            </a:r>
+          </a:p>
+        </p:txBody>
+      </p:sp>
+      <p:sp>
+        <p:nvSpPr>
+          <p:cNvPr id="51" name="Textfeld 50">
+            <a:extLst>
+              <a:ext uri="{FF2B5EF4-FFF2-40B4-BE49-F238E27FC236}">
+                <a16:creationId xmlns:a16="http://schemas.microsoft.com/office/drawing/2014/main" id="{7C47FD44-71DF-0036-8B9D-ED4AA384E6EE}"/>
+              </a:ext>
+            </a:extLst>
+          </p:cNvPr>
+          <p:cNvSpPr txBox="1"/>
+          <p:nvPr/>
+        </p:nvSpPr>
+        <p:spPr>
+          <a:xfrm>
+            <a:off x="5886967" y="3520654"/>
+            <a:ext cx="1180355" cy="461665"/>
+          </a:xfrm>
+          <a:prstGeom prst="rect">
+            <a:avLst/>
+          </a:prstGeom>
+          <a:noFill/>
+        </p:spPr>
+        <p:txBody>
+          <a:bodyPr wrap="square" rtlCol="0">
+            <a:spAutoFit/>
+          </a:bodyPr>
+          <a:lstStyle/>
+          <a:p>
+            <a:r>
+              <a:rPr lang="de-CH" sz="800" b="1" dirty="0">
+                <a:latin typeface="Arial" panose="020B0604020202020204" pitchFamily="34" charset="0"/>
+                <a:cs typeface="Arial" panose="020B0604020202020204" pitchFamily="34" charset="0"/>
+              </a:rPr>
+              <a:t>ConcertData.js</a:t>
+            </a:r>
+          </a:p>
+          <a:p>
+            <a:r>
+              <a:rPr lang="de-CH" sz="800" b="1" dirty="0">
+                <a:latin typeface="Arial" panose="020B0604020202020204" pitchFamily="34" charset="0"/>
+                <a:cs typeface="Arial" panose="020B0604020202020204" pitchFamily="34" charset="0"/>
+              </a:rPr>
+              <a:t>SeasonXml.js</a:t>
+            </a:r>
+          </a:p>
+          <a:p>
+            <a:r>
+              <a:rPr lang="de-CH" sz="800" b="1" dirty="0" err="1">
+                <a:latin typeface="Arial" panose="020B0604020202020204" pitchFamily="34" charset="0"/>
+                <a:cs typeface="Arial" panose="020B0604020202020204" pitchFamily="34" charset="0"/>
+              </a:rPr>
+              <a:t>QrCodeFilesXml,js</a:t>
+            </a:r>
+            <a:endParaRPr lang="de-CH" sz="800" b="1" dirty="0">
+              <a:latin typeface="Arial" panose="020B0604020202020204" pitchFamily="34" charset="0"/>
+              <a:cs typeface="Arial" panose="020B0604020202020204" pitchFamily="34" charset="0"/>
+            </a:endParaRPr>
+          </a:p>
+        </p:txBody>
+      </p:sp>
     </p:spTree>
     <p:extLst>
       <p:ext uri="{BB962C8B-B14F-4D97-AF65-F5344CB8AC3E}">

</xml_diff>

<commit_message>
QR code image for supporter card
</commit_message>
<xml_diff>
--- a/Descriptions/WwwQrCodeImages.pptx
+++ b/Descriptions/WwwQrCodeImages.pptx
@@ -2994,7 +2994,7 @@
         </p:nvSpPr>
         <p:spPr>
           <a:xfrm>
-            <a:off x="1036320" y="2166628"/>
+            <a:off x="1036320" y="2669968"/>
             <a:ext cx="3919728" cy="2893052"/>
           </a:xfrm>
           <a:prstGeom prst="rect">
@@ -3038,12 +3038,987 @@
           </a:p>
         </p:txBody>
       </p:sp>
+      <p:sp>
+        <p:nvSpPr>
+          <p:cNvPr id="7" name="Rechteck 6">
+            <a:extLst>
+              <a:ext uri="{FF2B5EF4-FFF2-40B4-BE49-F238E27FC236}">
+                <a16:creationId xmlns:a16="http://schemas.microsoft.com/office/drawing/2014/main" id="{9A61A60D-2FDE-533A-B5F4-429239D11023}"/>
+              </a:ext>
+            </a:extLst>
+          </p:cNvPr>
+          <p:cNvSpPr/>
+          <p:nvPr/>
+        </p:nvSpPr>
+        <p:spPr>
+          <a:xfrm>
+            <a:off x="6676743" y="2566336"/>
+            <a:ext cx="3919728" cy="2996684"/>
+          </a:xfrm>
+          <a:prstGeom prst="rect">
+            <a:avLst/>
+          </a:prstGeom>
+          <a:noFill/>
+          <a:ln>
+            <a:solidFill>
+              <a:schemeClr val="tx1"/>
+            </a:solidFill>
+          </a:ln>
+        </p:spPr>
+        <p:style>
+          <a:lnRef idx="2">
+            <a:schemeClr val="accent1">
+              <a:shade val="50000"/>
+            </a:schemeClr>
+          </a:lnRef>
+          <a:fillRef idx="1">
+            <a:schemeClr val="accent1"/>
+          </a:fillRef>
+          <a:effectRef idx="0">
+            <a:schemeClr val="accent1"/>
+          </a:effectRef>
+          <a:fontRef idx="minor">
+            <a:schemeClr val="lt1"/>
+          </a:fontRef>
+        </p:style>
+        <p:txBody>
+          <a:bodyPr rtlCol="0" anchor="ctr"/>
+          <a:lstStyle/>
+          <a:p>
+            <a:pPr algn="ctr"/>
+            <a:endParaRPr lang="de-CH" sz="1000" b="1" dirty="0">
+              <a:solidFill>
+                <a:schemeClr val="tx1"/>
+              </a:solidFill>
+              <a:latin typeface="Arial" panose="020B0604020202020204" pitchFamily="34" charset="0"/>
+              <a:cs typeface="Arial" panose="020B0604020202020204" pitchFamily="34" charset="0"/>
+            </a:endParaRPr>
+          </a:p>
+        </p:txBody>
+      </p:sp>
+      <p:sp>
+        <p:nvSpPr>
+          <p:cNvPr id="8" name="Textfeld 7">
+            <a:extLst>
+              <a:ext uri="{FF2B5EF4-FFF2-40B4-BE49-F238E27FC236}">
+                <a16:creationId xmlns:a16="http://schemas.microsoft.com/office/drawing/2014/main" id="{EEDEF138-DEC4-FA23-EFBD-977AE97D8DB3}"/>
+              </a:ext>
+            </a:extLst>
+          </p:cNvPr>
+          <p:cNvSpPr txBox="1"/>
+          <p:nvPr/>
+        </p:nvSpPr>
+        <p:spPr>
+          <a:xfrm>
+            <a:off x="1036319" y="2669968"/>
+            <a:ext cx="2593253" cy="230832"/>
+          </a:xfrm>
+          <a:prstGeom prst="rect">
+            <a:avLst/>
+          </a:prstGeom>
+          <a:noFill/>
+        </p:spPr>
+        <p:txBody>
+          <a:bodyPr wrap="square" rtlCol="0">
+            <a:spAutoFit/>
+          </a:bodyPr>
+          <a:lstStyle/>
+          <a:p>
+            <a:r>
+              <a:rPr lang="de-CH" sz="900" b="1" dirty="0" err="1">
+                <a:latin typeface="Arial" panose="020B0604020202020204" pitchFamily="34" charset="0"/>
+                <a:cs typeface="Arial" panose="020B0604020202020204" pitchFamily="34" charset="0"/>
+              </a:rPr>
+              <a:t>cl_div_supporter_card_front</a:t>
+            </a:r>
+            <a:r>
+              <a:rPr lang="de-CH" sz="900" b="1" dirty="0">
+                <a:latin typeface="Arial" panose="020B0604020202020204" pitchFamily="34" charset="0"/>
+                <a:cs typeface="Arial" panose="020B0604020202020204" pitchFamily="34" charset="0"/>
+              </a:rPr>
+              <a:t>  78 X 48 mm</a:t>
+            </a:r>
+          </a:p>
+        </p:txBody>
+      </p:sp>
+      <p:sp>
+        <p:nvSpPr>
+          <p:cNvPr id="9" name="Textfeld 8">
+            <a:extLst>
+              <a:ext uri="{FF2B5EF4-FFF2-40B4-BE49-F238E27FC236}">
+                <a16:creationId xmlns:a16="http://schemas.microsoft.com/office/drawing/2014/main" id="{63120305-67F4-1425-2085-63676B88AD87}"/>
+              </a:ext>
+            </a:extLst>
+          </p:cNvPr>
+          <p:cNvSpPr txBox="1"/>
+          <p:nvPr/>
+        </p:nvSpPr>
+        <p:spPr>
+          <a:xfrm>
+            <a:off x="6676742" y="2621200"/>
+            <a:ext cx="3076857" cy="230832"/>
+          </a:xfrm>
+          <a:prstGeom prst="rect">
+            <a:avLst/>
+          </a:prstGeom>
+          <a:noFill/>
+        </p:spPr>
+        <p:txBody>
+          <a:bodyPr wrap="square" rtlCol="0">
+            <a:spAutoFit/>
+          </a:bodyPr>
+          <a:lstStyle/>
+          <a:p>
+            <a:r>
+              <a:rPr lang="de-CH" sz="900" b="1" dirty="0" err="1">
+                <a:latin typeface="Arial" panose="020B0604020202020204" pitchFamily="34" charset="0"/>
+                <a:cs typeface="Arial" panose="020B0604020202020204" pitchFamily="34" charset="0"/>
+              </a:rPr>
+              <a:t>cl_div_supporter_card_reverse</a:t>
+            </a:r>
+            <a:r>
+              <a:rPr lang="de-CH" sz="900" b="1" dirty="0">
+                <a:latin typeface="Arial" panose="020B0604020202020204" pitchFamily="34" charset="0"/>
+                <a:cs typeface="Arial" panose="020B0604020202020204" pitchFamily="34" charset="0"/>
+              </a:rPr>
+              <a:t> 78 X 48 mm</a:t>
+            </a:r>
+          </a:p>
+        </p:txBody>
+      </p:sp>
+      <p:sp>
+        <p:nvSpPr>
+          <p:cNvPr id="10" name="Rechteck 9">
+            <a:extLst>
+              <a:ext uri="{FF2B5EF4-FFF2-40B4-BE49-F238E27FC236}">
+                <a16:creationId xmlns:a16="http://schemas.microsoft.com/office/drawing/2014/main" id="{81AD996F-B251-9CE6-29DE-D6A21FC4B5C0}"/>
+              </a:ext>
+            </a:extLst>
+          </p:cNvPr>
+          <p:cNvSpPr/>
+          <p:nvPr/>
+        </p:nvSpPr>
+        <p:spPr>
+          <a:xfrm>
+            <a:off x="1146048" y="2956480"/>
+            <a:ext cx="3718560" cy="310122"/>
+          </a:xfrm>
+          <a:prstGeom prst="rect">
+            <a:avLst/>
+          </a:prstGeom>
+          <a:noFill/>
+          <a:ln>
+            <a:solidFill>
+              <a:schemeClr val="tx1"/>
+            </a:solidFill>
+          </a:ln>
+        </p:spPr>
+        <p:style>
+          <a:lnRef idx="2">
+            <a:schemeClr val="accent1">
+              <a:shade val="50000"/>
+            </a:schemeClr>
+          </a:lnRef>
+          <a:fillRef idx="1">
+            <a:schemeClr val="accent1"/>
+          </a:fillRef>
+          <a:effectRef idx="0">
+            <a:schemeClr val="accent1"/>
+          </a:effectRef>
+          <a:fontRef idx="minor">
+            <a:schemeClr val="lt1"/>
+          </a:fontRef>
+        </p:style>
+        <p:txBody>
+          <a:bodyPr rtlCol="0" anchor="ctr"/>
+          <a:lstStyle/>
+          <a:p>
+            <a:pPr algn="ctr"/>
+            <a:endParaRPr lang="de-CH" sz="1000" b="1" dirty="0">
+              <a:solidFill>
+                <a:schemeClr val="tx1"/>
+              </a:solidFill>
+              <a:latin typeface="Arial" panose="020B0604020202020204" pitchFamily="34" charset="0"/>
+              <a:cs typeface="Arial" panose="020B0604020202020204" pitchFamily="34" charset="0"/>
+            </a:endParaRPr>
+          </a:p>
+        </p:txBody>
+      </p:sp>
+      <p:sp>
+        <p:nvSpPr>
+          <p:cNvPr id="11" name="Textfeld 10">
+            <a:extLst>
+              <a:ext uri="{FF2B5EF4-FFF2-40B4-BE49-F238E27FC236}">
+                <a16:creationId xmlns:a16="http://schemas.microsoft.com/office/drawing/2014/main" id="{2726B3D1-0C78-E55A-EEB0-419BFB8D98DE}"/>
+              </a:ext>
+            </a:extLst>
+          </p:cNvPr>
+          <p:cNvSpPr txBox="1"/>
+          <p:nvPr/>
+        </p:nvSpPr>
+        <p:spPr>
+          <a:xfrm>
+            <a:off x="1111889" y="2934686"/>
+            <a:ext cx="2593253" cy="230832"/>
+          </a:xfrm>
+          <a:prstGeom prst="rect">
+            <a:avLst/>
+          </a:prstGeom>
+          <a:noFill/>
+        </p:spPr>
+        <p:txBody>
+          <a:bodyPr wrap="square" rtlCol="0">
+            <a:spAutoFit/>
+          </a:bodyPr>
+          <a:lstStyle/>
+          <a:p>
+            <a:r>
+              <a:rPr lang="de-CH" sz="900" b="1" dirty="0">
+                <a:latin typeface="Arial" panose="020B0604020202020204" pitchFamily="34" charset="0"/>
+                <a:cs typeface="Arial" panose="020B0604020202020204" pitchFamily="34" charset="0"/>
+              </a:rPr>
+              <a:t>cl_div_supporter</a:t>
+            </a:r>
+            <a:r>
+              <a:rPr lang="de-CH" sz="900" b="1">
+                <a:latin typeface="Arial" panose="020B0604020202020204" pitchFamily="34" charset="0"/>
+                <a:cs typeface="Arial" panose="020B0604020202020204" pitchFamily="34" charset="0"/>
+              </a:rPr>
+              <a:t>_card_</a:t>
+            </a:r>
+            <a:r>
+              <a:rPr lang="de-CH" sz="900" b="1" dirty="0" err="1">
+                <a:latin typeface="Arial" panose="020B0604020202020204" pitchFamily="34" charset="0"/>
+                <a:cs typeface="Arial" panose="020B0604020202020204" pitchFamily="34" charset="0"/>
+              </a:rPr>
+              <a:t>logo</a:t>
+            </a:r>
+            <a:endParaRPr lang="de-CH" sz="900" b="1" dirty="0">
+              <a:latin typeface="Arial" panose="020B0604020202020204" pitchFamily="34" charset="0"/>
+              <a:cs typeface="Arial" panose="020B0604020202020204" pitchFamily="34" charset="0"/>
+            </a:endParaRPr>
+          </a:p>
+        </p:txBody>
+      </p:sp>
+      <p:sp>
+        <p:nvSpPr>
+          <p:cNvPr id="12" name="Rechteck 11">
+            <a:extLst>
+              <a:ext uri="{FF2B5EF4-FFF2-40B4-BE49-F238E27FC236}">
+                <a16:creationId xmlns:a16="http://schemas.microsoft.com/office/drawing/2014/main" id="{5B63D0F0-5E43-37A3-6DCE-E1B835A25B4C}"/>
+              </a:ext>
+            </a:extLst>
+          </p:cNvPr>
+          <p:cNvSpPr/>
+          <p:nvPr/>
+        </p:nvSpPr>
+        <p:spPr>
+          <a:xfrm>
+            <a:off x="1161024" y="3314370"/>
+            <a:ext cx="3718560" cy="310122"/>
+          </a:xfrm>
+          <a:prstGeom prst="rect">
+            <a:avLst/>
+          </a:prstGeom>
+          <a:noFill/>
+          <a:ln>
+            <a:solidFill>
+              <a:schemeClr val="tx1"/>
+            </a:solidFill>
+          </a:ln>
+        </p:spPr>
+        <p:style>
+          <a:lnRef idx="2">
+            <a:schemeClr val="accent1">
+              <a:shade val="50000"/>
+            </a:schemeClr>
+          </a:lnRef>
+          <a:fillRef idx="1">
+            <a:schemeClr val="accent1"/>
+          </a:fillRef>
+          <a:effectRef idx="0">
+            <a:schemeClr val="accent1"/>
+          </a:effectRef>
+          <a:fontRef idx="minor">
+            <a:schemeClr val="lt1"/>
+          </a:fontRef>
+        </p:style>
+        <p:txBody>
+          <a:bodyPr rtlCol="0" anchor="ctr"/>
+          <a:lstStyle/>
+          <a:p>
+            <a:pPr algn="ctr"/>
+            <a:endParaRPr lang="de-CH" sz="1000" b="1" dirty="0">
+              <a:solidFill>
+                <a:schemeClr val="tx1"/>
+              </a:solidFill>
+              <a:latin typeface="Arial" panose="020B0604020202020204" pitchFamily="34" charset="0"/>
+              <a:cs typeface="Arial" panose="020B0604020202020204" pitchFamily="34" charset="0"/>
+            </a:endParaRPr>
+          </a:p>
+        </p:txBody>
+      </p:sp>
+      <p:sp>
+        <p:nvSpPr>
+          <p:cNvPr id="13" name="Textfeld 12">
+            <a:extLst>
+              <a:ext uri="{FF2B5EF4-FFF2-40B4-BE49-F238E27FC236}">
+                <a16:creationId xmlns:a16="http://schemas.microsoft.com/office/drawing/2014/main" id="{9A9CCC90-41D9-F167-F613-3F072FAA5BF9}"/>
+              </a:ext>
+            </a:extLst>
+          </p:cNvPr>
+          <p:cNvSpPr txBox="1"/>
+          <p:nvPr/>
+        </p:nvSpPr>
+        <p:spPr>
+          <a:xfrm>
+            <a:off x="1161024" y="3296082"/>
+            <a:ext cx="2593253" cy="230832"/>
+          </a:xfrm>
+          <a:prstGeom prst="rect">
+            <a:avLst/>
+          </a:prstGeom>
+          <a:noFill/>
+        </p:spPr>
+        <p:txBody>
+          <a:bodyPr wrap="square" rtlCol="0">
+            <a:spAutoFit/>
+          </a:bodyPr>
+          <a:lstStyle/>
+          <a:p>
+            <a:r>
+              <a:rPr lang="de-CH" sz="900" b="1" dirty="0" err="1">
+                <a:latin typeface="Arial" panose="020B0604020202020204" pitchFamily="34" charset="0"/>
+                <a:cs typeface="Arial" panose="020B0604020202020204" pitchFamily="34" charset="0"/>
+              </a:rPr>
+              <a:t>cl_div_supporter_card_name</a:t>
+            </a:r>
+            <a:endParaRPr lang="de-CH" sz="900" b="1" dirty="0">
+              <a:latin typeface="Arial" panose="020B0604020202020204" pitchFamily="34" charset="0"/>
+              <a:cs typeface="Arial" panose="020B0604020202020204" pitchFamily="34" charset="0"/>
+            </a:endParaRPr>
+          </a:p>
+        </p:txBody>
+      </p:sp>
+      <p:sp>
+        <p:nvSpPr>
+          <p:cNvPr id="14" name="Rechteck 13">
+            <a:extLst>
+              <a:ext uri="{FF2B5EF4-FFF2-40B4-BE49-F238E27FC236}">
+                <a16:creationId xmlns:a16="http://schemas.microsoft.com/office/drawing/2014/main" id="{5A1230E4-8BEB-584B-8EDC-3CEDD409232D}"/>
+              </a:ext>
+            </a:extLst>
+          </p:cNvPr>
+          <p:cNvSpPr/>
+          <p:nvPr/>
+        </p:nvSpPr>
+        <p:spPr>
+          <a:xfrm>
+            <a:off x="1161024" y="3665327"/>
+            <a:ext cx="3718560" cy="1794061"/>
+          </a:xfrm>
+          <a:prstGeom prst="rect">
+            <a:avLst/>
+          </a:prstGeom>
+          <a:noFill/>
+          <a:ln>
+            <a:solidFill>
+              <a:schemeClr val="tx1"/>
+            </a:solidFill>
+          </a:ln>
+        </p:spPr>
+        <p:style>
+          <a:lnRef idx="2">
+            <a:schemeClr val="accent1">
+              <a:shade val="50000"/>
+            </a:schemeClr>
+          </a:lnRef>
+          <a:fillRef idx="1">
+            <a:schemeClr val="accent1"/>
+          </a:fillRef>
+          <a:effectRef idx="0">
+            <a:schemeClr val="accent1"/>
+          </a:effectRef>
+          <a:fontRef idx="minor">
+            <a:schemeClr val="lt1"/>
+          </a:fontRef>
+        </p:style>
+        <p:txBody>
+          <a:bodyPr rtlCol="0" anchor="ctr"/>
+          <a:lstStyle/>
+          <a:p>
+            <a:pPr algn="ctr"/>
+            <a:endParaRPr lang="de-CH" sz="1000" b="1" dirty="0">
+              <a:solidFill>
+                <a:schemeClr val="tx1"/>
+              </a:solidFill>
+              <a:latin typeface="Arial" panose="020B0604020202020204" pitchFamily="34" charset="0"/>
+              <a:cs typeface="Arial" panose="020B0604020202020204" pitchFamily="34" charset="0"/>
+            </a:endParaRPr>
+          </a:p>
+        </p:txBody>
+      </p:sp>
+      <p:sp>
+        <p:nvSpPr>
+          <p:cNvPr id="15" name="Textfeld 14">
+            <a:extLst>
+              <a:ext uri="{FF2B5EF4-FFF2-40B4-BE49-F238E27FC236}">
+                <a16:creationId xmlns:a16="http://schemas.microsoft.com/office/drawing/2014/main" id="{D6325553-BC9E-E12F-9A05-9A61D3BF051D}"/>
+              </a:ext>
+            </a:extLst>
+          </p:cNvPr>
+          <p:cNvSpPr txBox="1"/>
+          <p:nvPr/>
+        </p:nvSpPr>
+        <p:spPr>
+          <a:xfrm>
+            <a:off x="1161024" y="3665327"/>
+            <a:ext cx="2593253" cy="230832"/>
+          </a:xfrm>
+          <a:prstGeom prst="rect">
+            <a:avLst/>
+          </a:prstGeom>
+          <a:noFill/>
+        </p:spPr>
+        <p:txBody>
+          <a:bodyPr wrap="square" rtlCol="0">
+            <a:spAutoFit/>
+          </a:bodyPr>
+          <a:lstStyle/>
+          <a:p>
+            <a:r>
+              <a:rPr lang="de-CH" sz="900" b="1" dirty="0" err="1">
+                <a:latin typeface="Arial" panose="020B0604020202020204" pitchFamily="34" charset="0"/>
+                <a:cs typeface="Arial" panose="020B0604020202020204" pitchFamily="34" charset="0"/>
+              </a:rPr>
+              <a:t>cl_div_supporter_card_text_canvas</a:t>
+            </a:r>
+            <a:endParaRPr lang="de-CH" sz="900" b="1" dirty="0">
+              <a:latin typeface="Arial" panose="020B0604020202020204" pitchFamily="34" charset="0"/>
+              <a:cs typeface="Arial" panose="020B0604020202020204" pitchFamily="34" charset="0"/>
+            </a:endParaRPr>
+          </a:p>
+        </p:txBody>
+      </p:sp>
+      <p:sp>
+        <p:nvSpPr>
+          <p:cNvPr id="16" name="Rechteck 15">
+            <a:extLst>
+              <a:ext uri="{FF2B5EF4-FFF2-40B4-BE49-F238E27FC236}">
+                <a16:creationId xmlns:a16="http://schemas.microsoft.com/office/drawing/2014/main" id="{2BC134D5-E1BD-66DD-C017-5B238538DEBA}"/>
+              </a:ext>
+            </a:extLst>
+          </p:cNvPr>
+          <p:cNvSpPr/>
+          <p:nvPr/>
+        </p:nvSpPr>
+        <p:spPr>
+          <a:xfrm>
+            <a:off x="1221984" y="3950628"/>
+            <a:ext cx="1576080" cy="1411224"/>
+          </a:xfrm>
+          <a:prstGeom prst="rect">
+            <a:avLst/>
+          </a:prstGeom>
+          <a:noFill/>
+          <a:ln>
+            <a:solidFill>
+              <a:schemeClr val="tx1"/>
+            </a:solidFill>
+          </a:ln>
+        </p:spPr>
+        <p:style>
+          <a:lnRef idx="2">
+            <a:schemeClr val="accent1">
+              <a:shade val="50000"/>
+            </a:schemeClr>
+          </a:lnRef>
+          <a:fillRef idx="1">
+            <a:schemeClr val="accent1"/>
+          </a:fillRef>
+          <a:effectRef idx="0">
+            <a:schemeClr val="accent1"/>
+          </a:effectRef>
+          <a:fontRef idx="minor">
+            <a:schemeClr val="lt1"/>
+          </a:fontRef>
+        </p:style>
+        <p:txBody>
+          <a:bodyPr rtlCol="0" anchor="ctr"/>
+          <a:lstStyle/>
+          <a:p>
+            <a:pPr algn="ctr"/>
+            <a:endParaRPr lang="de-CH" sz="1000" b="1" dirty="0">
+              <a:solidFill>
+                <a:schemeClr val="tx1"/>
+              </a:solidFill>
+              <a:latin typeface="Arial" panose="020B0604020202020204" pitchFamily="34" charset="0"/>
+              <a:cs typeface="Arial" panose="020B0604020202020204" pitchFamily="34" charset="0"/>
+            </a:endParaRPr>
+          </a:p>
+        </p:txBody>
+      </p:sp>
+      <p:sp>
+        <p:nvSpPr>
+          <p:cNvPr id="17" name="Rechteck 16">
+            <a:extLst>
+              <a:ext uri="{FF2B5EF4-FFF2-40B4-BE49-F238E27FC236}">
+                <a16:creationId xmlns:a16="http://schemas.microsoft.com/office/drawing/2014/main" id="{BA89520A-F0EE-1C0C-417B-BDBE4EE933DF}"/>
+              </a:ext>
+            </a:extLst>
+          </p:cNvPr>
+          <p:cNvSpPr/>
+          <p:nvPr/>
+        </p:nvSpPr>
+        <p:spPr>
+          <a:xfrm>
+            <a:off x="2855712" y="3944531"/>
+            <a:ext cx="1946280" cy="1411224"/>
+          </a:xfrm>
+          <a:prstGeom prst="rect">
+            <a:avLst/>
+          </a:prstGeom>
+          <a:noFill/>
+          <a:ln>
+            <a:solidFill>
+              <a:schemeClr val="tx1"/>
+            </a:solidFill>
+          </a:ln>
+        </p:spPr>
+        <p:style>
+          <a:lnRef idx="2">
+            <a:schemeClr val="accent1">
+              <a:shade val="50000"/>
+            </a:schemeClr>
+          </a:lnRef>
+          <a:fillRef idx="1">
+            <a:schemeClr val="accent1"/>
+          </a:fillRef>
+          <a:effectRef idx="0">
+            <a:schemeClr val="accent1"/>
+          </a:effectRef>
+          <a:fontRef idx="minor">
+            <a:schemeClr val="lt1"/>
+          </a:fontRef>
+        </p:style>
+        <p:txBody>
+          <a:bodyPr rtlCol="0" anchor="ctr"/>
+          <a:lstStyle/>
+          <a:p>
+            <a:pPr algn="ctr"/>
+            <a:endParaRPr lang="de-CH" sz="1000" b="1" dirty="0">
+              <a:solidFill>
+                <a:schemeClr val="tx1"/>
+              </a:solidFill>
+              <a:latin typeface="Arial" panose="020B0604020202020204" pitchFamily="34" charset="0"/>
+              <a:cs typeface="Arial" panose="020B0604020202020204" pitchFamily="34" charset="0"/>
+            </a:endParaRPr>
+          </a:p>
+        </p:txBody>
+      </p:sp>
+      <p:sp>
+        <p:nvSpPr>
+          <p:cNvPr id="18" name="Textfeld 17">
+            <a:extLst>
+              <a:ext uri="{FF2B5EF4-FFF2-40B4-BE49-F238E27FC236}">
+                <a16:creationId xmlns:a16="http://schemas.microsoft.com/office/drawing/2014/main" id="{2C9233CF-6A0D-A5F0-B64A-6A84376F43B1}"/>
+              </a:ext>
+            </a:extLst>
+          </p:cNvPr>
+          <p:cNvSpPr txBox="1"/>
+          <p:nvPr/>
+        </p:nvSpPr>
+        <p:spPr>
+          <a:xfrm>
+            <a:off x="1154929" y="3960567"/>
+            <a:ext cx="1901952" cy="230832"/>
+          </a:xfrm>
+          <a:prstGeom prst="rect">
+            <a:avLst/>
+          </a:prstGeom>
+          <a:noFill/>
+        </p:spPr>
+        <p:txBody>
+          <a:bodyPr wrap="square" rtlCol="0">
+            <a:spAutoFit/>
+          </a:bodyPr>
+          <a:lstStyle/>
+          <a:p>
+            <a:r>
+              <a:rPr lang="de-CH" sz="900" b="1" dirty="0" err="1">
+                <a:latin typeface="Arial" panose="020B0604020202020204" pitchFamily="34" charset="0"/>
+                <a:cs typeface="Arial" panose="020B0604020202020204" pitchFamily="34" charset="0"/>
+              </a:rPr>
+              <a:t>cl_div_supporter_card_text</a:t>
+            </a:r>
+            <a:endParaRPr lang="de-CH" sz="900" b="1" dirty="0">
+              <a:latin typeface="Arial" panose="020B0604020202020204" pitchFamily="34" charset="0"/>
+              <a:cs typeface="Arial" panose="020B0604020202020204" pitchFamily="34" charset="0"/>
+            </a:endParaRPr>
+          </a:p>
+        </p:txBody>
+      </p:sp>
+      <p:sp>
+        <p:nvSpPr>
+          <p:cNvPr id="19" name="Textfeld 18">
+            <a:extLst>
+              <a:ext uri="{FF2B5EF4-FFF2-40B4-BE49-F238E27FC236}">
+                <a16:creationId xmlns:a16="http://schemas.microsoft.com/office/drawing/2014/main" id="{108C5F41-34C2-7E6F-EA11-E7A18353F18E}"/>
+              </a:ext>
+            </a:extLst>
+          </p:cNvPr>
+          <p:cNvSpPr txBox="1"/>
+          <p:nvPr/>
+        </p:nvSpPr>
+        <p:spPr>
+          <a:xfrm>
+            <a:off x="2805816" y="3926489"/>
+            <a:ext cx="2198472" cy="230832"/>
+          </a:xfrm>
+          <a:prstGeom prst="rect">
+            <a:avLst/>
+          </a:prstGeom>
+          <a:noFill/>
+        </p:spPr>
+        <p:txBody>
+          <a:bodyPr wrap="square" rtlCol="0">
+            <a:spAutoFit/>
+          </a:bodyPr>
+          <a:lstStyle/>
+          <a:p>
+            <a:r>
+              <a:rPr lang="de-CH" sz="900" b="1" dirty="0" err="1">
+                <a:latin typeface="Arial" panose="020B0604020202020204" pitchFamily="34" charset="0"/>
+                <a:cs typeface="Arial" panose="020B0604020202020204" pitchFamily="34" charset="0"/>
+              </a:rPr>
+              <a:t>cl_div_supporter_card_qr_image</a:t>
+            </a:r>
+            <a:endParaRPr lang="de-CH" sz="900" b="1" dirty="0">
+              <a:latin typeface="Arial" panose="020B0604020202020204" pitchFamily="34" charset="0"/>
+              <a:cs typeface="Arial" panose="020B0604020202020204" pitchFamily="34" charset="0"/>
+            </a:endParaRPr>
+          </a:p>
+        </p:txBody>
+      </p:sp>
+      <p:sp>
+        <p:nvSpPr>
+          <p:cNvPr id="20" name="Rechteck 19">
+            <a:extLst>
+              <a:ext uri="{FF2B5EF4-FFF2-40B4-BE49-F238E27FC236}">
+                <a16:creationId xmlns:a16="http://schemas.microsoft.com/office/drawing/2014/main" id="{8E6C58B6-A689-554D-A1C0-8C3695019631}"/>
+              </a:ext>
+            </a:extLst>
+          </p:cNvPr>
+          <p:cNvSpPr/>
+          <p:nvPr/>
+        </p:nvSpPr>
+        <p:spPr>
+          <a:xfrm>
+            <a:off x="2922767" y="4193896"/>
+            <a:ext cx="1791845" cy="1082612"/>
+          </a:xfrm>
+          <a:prstGeom prst="rect">
+            <a:avLst/>
+          </a:prstGeom>
+          <a:noFill/>
+          <a:ln>
+            <a:solidFill>
+              <a:schemeClr val="tx1"/>
+            </a:solidFill>
+          </a:ln>
+        </p:spPr>
+        <p:style>
+          <a:lnRef idx="2">
+            <a:schemeClr val="accent1">
+              <a:shade val="50000"/>
+            </a:schemeClr>
+          </a:lnRef>
+          <a:fillRef idx="1">
+            <a:schemeClr val="accent1"/>
+          </a:fillRef>
+          <a:effectRef idx="0">
+            <a:schemeClr val="accent1"/>
+          </a:effectRef>
+          <a:fontRef idx="minor">
+            <a:schemeClr val="lt1"/>
+          </a:fontRef>
+        </p:style>
+        <p:txBody>
+          <a:bodyPr rtlCol="0" anchor="ctr"/>
+          <a:lstStyle/>
+          <a:p>
+            <a:pPr algn="ctr"/>
+            <a:endParaRPr lang="de-CH" sz="1000" b="1" dirty="0">
+              <a:solidFill>
+                <a:schemeClr val="tx1"/>
+              </a:solidFill>
+              <a:latin typeface="Arial" panose="020B0604020202020204" pitchFamily="34" charset="0"/>
+              <a:cs typeface="Arial" panose="020B0604020202020204" pitchFamily="34" charset="0"/>
+            </a:endParaRPr>
+          </a:p>
+        </p:txBody>
+      </p:sp>
+      <p:sp>
+        <p:nvSpPr>
+          <p:cNvPr id="21" name="Textfeld 20">
+            <a:extLst>
+              <a:ext uri="{FF2B5EF4-FFF2-40B4-BE49-F238E27FC236}">
+                <a16:creationId xmlns:a16="http://schemas.microsoft.com/office/drawing/2014/main" id="{E34F62EE-6928-CB73-C959-0165B47D20CE}"/>
+              </a:ext>
+            </a:extLst>
+          </p:cNvPr>
+          <p:cNvSpPr txBox="1"/>
+          <p:nvPr/>
+        </p:nvSpPr>
+        <p:spPr>
+          <a:xfrm>
+            <a:off x="2876184" y="4232234"/>
+            <a:ext cx="1988424" cy="369332"/>
+          </a:xfrm>
+          <a:prstGeom prst="rect">
+            <a:avLst/>
+          </a:prstGeom>
+          <a:noFill/>
+        </p:spPr>
+        <p:txBody>
+          <a:bodyPr wrap="square" rtlCol="0">
+            <a:spAutoFit/>
+          </a:bodyPr>
+          <a:lstStyle/>
+          <a:p>
+            <a:r>
+              <a:rPr lang="de-CH" sz="900" b="1" dirty="0" err="1">
+                <a:latin typeface="Arial" panose="020B0604020202020204" pitchFamily="34" charset="0"/>
+                <a:cs typeface="Arial" panose="020B0604020202020204" pitchFamily="34" charset="0"/>
+              </a:rPr>
+              <a:t>id_supporter_card_qr_image</a:t>
+            </a:r>
+            <a:endParaRPr lang="de-CH" sz="900" b="1" dirty="0">
+              <a:latin typeface="Arial" panose="020B0604020202020204" pitchFamily="34" charset="0"/>
+              <a:cs typeface="Arial" panose="020B0604020202020204" pitchFamily="34" charset="0"/>
+            </a:endParaRPr>
+          </a:p>
+          <a:p>
+            <a:r>
+              <a:rPr lang="de-CH" sz="900" b="1" dirty="0" err="1">
+                <a:latin typeface="Arial" panose="020B0604020202020204" pitchFamily="34" charset="0"/>
+                <a:cs typeface="Arial" panose="020B0604020202020204" pitchFamily="34" charset="0"/>
+              </a:rPr>
+              <a:t>cl_supporter_card_qr_image</a:t>
+            </a:r>
+            <a:endParaRPr lang="de-CH" sz="900" b="1" dirty="0">
+              <a:latin typeface="Arial" panose="020B0604020202020204" pitchFamily="34" charset="0"/>
+              <a:cs typeface="Arial" panose="020B0604020202020204" pitchFamily="34" charset="0"/>
+            </a:endParaRPr>
+          </a:p>
+        </p:txBody>
+      </p:sp>
+      <p:sp>
+        <p:nvSpPr>
+          <p:cNvPr id="22" name="Rechteck 21">
+            <a:extLst>
+              <a:ext uri="{FF2B5EF4-FFF2-40B4-BE49-F238E27FC236}">
+                <a16:creationId xmlns:a16="http://schemas.microsoft.com/office/drawing/2014/main" id="{DAA13049-6140-1AD7-9768-53AAF04F3D24}"/>
+              </a:ext>
+            </a:extLst>
+          </p:cNvPr>
+          <p:cNvSpPr/>
+          <p:nvPr/>
+        </p:nvSpPr>
+        <p:spPr>
+          <a:xfrm>
+            <a:off x="6801447" y="2852031"/>
+            <a:ext cx="3701961" cy="1108535"/>
+          </a:xfrm>
+          <a:prstGeom prst="rect">
+            <a:avLst/>
+          </a:prstGeom>
+          <a:noFill/>
+          <a:ln>
+            <a:solidFill>
+              <a:schemeClr val="tx1"/>
+            </a:solidFill>
+          </a:ln>
+        </p:spPr>
+        <p:style>
+          <a:lnRef idx="2">
+            <a:schemeClr val="accent1">
+              <a:shade val="50000"/>
+            </a:schemeClr>
+          </a:lnRef>
+          <a:fillRef idx="1">
+            <a:schemeClr val="accent1"/>
+          </a:fillRef>
+          <a:effectRef idx="0">
+            <a:schemeClr val="accent1"/>
+          </a:effectRef>
+          <a:fontRef idx="minor">
+            <a:schemeClr val="lt1"/>
+          </a:fontRef>
+        </p:style>
+        <p:txBody>
+          <a:bodyPr rtlCol="0" anchor="ctr"/>
+          <a:lstStyle/>
+          <a:p>
+            <a:pPr algn="ctr"/>
+            <a:endParaRPr lang="de-CH" sz="1000" b="1" dirty="0">
+              <a:solidFill>
+                <a:schemeClr val="tx1"/>
+              </a:solidFill>
+              <a:latin typeface="Arial" panose="020B0604020202020204" pitchFamily="34" charset="0"/>
+              <a:cs typeface="Arial" panose="020B0604020202020204" pitchFamily="34" charset="0"/>
+            </a:endParaRPr>
+          </a:p>
+        </p:txBody>
+      </p:sp>
+      <p:sp>
+        <p:nvSpPr>
+          <p:cNvPr id="23" name="Textfeld 22">
+            <a:extLst>
+              <a:ext uri="{FF2B5EF4-FFF2-40B4-BE49-F238E27FC236}">
+                <a16:creationId xmlns:a16="http://schemas.microsoft.com/office/drawing/2014/main" id="{B450436E-9A0B-D1FD-9C1B-F3CDC49918AD}"/>
+              </a:ext>
+            </a:extLst>
+          </p:cNvPr>
+          <p:cNvSpPr txBox="1"/>
+          <p:nvPr/>
+        </p:nvSpPr>
+        <p:spPr>
+          <a:xfrm>
+            <a:off x="6752313" y="2900800"/>
+            <a:ext cx="3076857" cy="230832"/>
+          </a:xfrm>
+          <a:prstGeom prst="rect">
+            <a:avLst/>
+          </a:prstGeom>
+          <a:noFill/>
+        </p:spPr>
+        <p:txBody>
+          <a:bodyPr wrap="square" rtlCol="0">
+            <a:spAutoFit/>
+          </a:bodyPr>
+          <a:lstStyle/>
+          <a:p>
+            <a:r>
+              <a:rPr lang="de-CH" sz="900" b="1" dirty="0" err="1">
+                <a:latin typeface="Arial" panose="020B0604020202020204" pitchFamily="34" charset="0"/>
+                <a:cs typeface="Arial" panose="020B0604020202020204" pitchFamily="34" charset="0"/>
+              </a:rPr>
+              <a:t>cl_div_supporter_card_reverse_text</a:t>
+            </a:r>
+            <a:endParaRPr lang="de-CH" sz="900" b="1" dirty="0">
+              <a:latin typeface="Arial" panose="020B0604020202020204" pitchFamily="34" charset="0"/>
+              <a:cs typeface="Arial" panose="020B0604020202020204" pitchFamily="34" charset="0"/>
+            </a:endParaRPr>
+          </a:p>
+        </p:txBody>
+      </p:sp>
+      <p:sp>
+        <p:nvSpPr>
+          <p:cNvPr id="24" name="Rechteck 23">
+            <a:extLst>
+              <a:ext uri="{FF2B5EF4-FFF2-40B4-BE49-F238E27FC236}">
+                <a16:creationId xmlns:a16="http://schemas.microsoft.com/office/drawing/2014/main" id="{55097D92-56F1-9588-8019-B181B9291453}"/>
+              </a:ext>
+            </a:extLst>
+          </p:cNvPr>
+          <p:cNvSpPr/>
+          <p:nvPr/>
+        </p:nvSpPr>
+        <p:spPr>
+          <a:xfrm>
+            <a:off x="6801447" y="4112172"/>
+            <a:ext cx="3701961" cy="1310431"/>
+          </a:xfrm>
+          <a:prstGeom prst="rect">
+            <a:avLst/>
+          </a:prstGeom>
+          <a:noFill/>
+          <a:ln>
+            <a:solidFill>
+              <a:schemeClr val="tx1"/>
+            </a:solidFill>
+          </a:ln>
+        </p:spPr>
+        <p:style>
+          <a:lnRef idx="2">
+            <a:schemeClr val="accent1">
+              <a:shade val="50000"/>
+            </a:schemeClr>
+          </a:lnRef>
+          <a:fillRef idx="1">
+            <a:schemeClr val="accent1"/>
+          </a:fillRef>
+          <a:effectRef idx="0">
+            <a:schemeClr val="accent1"/>
+          </a:effectRef>
+          <a:fontRef idx="minor">
+            <a:schemeClr val="lt1"/>
+          </a:fontRef>
+        </p:style>
+        <p:txBody>
+          <a:bodyPr rtlCol="0" anchor="ctr"/>
+          <a:lstStyle/>
+          <a:p>
+            <a:pPr algn="ctr"/>
+            <a:endParaRPr lang="de-CH" sz="1000" b="1" dirty="0">
+              <a:solidFill>
+                <a:schemeClr val="tx1"/>
+              </a:solidFill>
+              <a:latin typeface="Arial" panose="020B0604020202020204" pitchFamily="34" charset="0"/>
+              <a:cs typeface="Arial" panose="020B0604020202020204" pitchFamily="34" charset="0"/>
+            </a:endParaRPr>
+          </a:p>
+        </p:txBody>
+      </p:sp>
+      <p:sp>
+        <p:nvSpPr>
+          <p:cNvPr id="25" name="Textfeld 24">
+            <a:extLst>
+              <a:ext uri="{FF2B5EF4-FFF2-40B4-BE49-F238E27FC236}">
+                <a16:creationId xmlns:a16="http://schemas.microsoft.com/office/drawing/2014/main" id="{9E0763B3-F99B-D9BA-CF1D-4595F5ABB37A}"/>
+              </a:ext>
+            </a:extLst>
+          </p:cNvPr>
+          <p:cNvSpPr txBox="1"/>
+          <p:nvPr/>
+        </p:nvSpPr>
+        <p:spPr>
+          <a:xfrm>
+            <a:off x="6801447" y="4186068"/>
+            <a:ext cx="3076857" cy="230832"/>
+          </a:xfrm>
+          <a:prstGeom prst="rect">
+            <a:avLst/>
+          </a:prstGeom>
+          <a:noFill/>
+        </p:spPr>
+        <p:txBody>
+          <a:bodyPr wrap="square" rtlCol="0">
+            <a:spAutoFit/>
+          </a:bodyPr>
+          <a:lstStyle/>
+          <a:p>
+            <a:r>
+              <a:rPr lang="de-CH" sz="900" b="1" dirty="0" err="1">
+                <a:latin typeface="Arial" panose="020B0604020202020204" pitchFamily="34" charset="0"/>
+                <a:cs typeface="Arial" panose="020B0604020202020204" pitchFamily="34" charset="0"/>
+              </a:rPr>
+              <a:t>cl_div_supporter_card_reverse_qr_show</a:t>
+            </a:r>
+            <a:endParaRPr lang="de-CH" sz="900" b="1" dirty="0">
+              <a:latin typeface="Arial" panose="020B0604020202020204" pitchFamily="34" charset="0"/>
+              <a:cs typeface="Arial" panose="020B0604020202020204" pitchFamily="34" charset="0"/>
+            </a:endParaRPr>
+          </a:p>
+        </p:txBody>
+      </p:sp>
       <p:pic>
         <p:nvPicPr>
-          <p:cNvPr id="5" name="Grafik 4">
-            <a:extLst>
-              <a:ext uri="{FF2B5EF4-FFF2-40B4-BE49-F238E27FC236}">
-                <a16:creationId xmlns:a16="http://schemas.microsoft.com/office/drawing/2014/main" id="{29F95C88-7E5B-AEC2-94C4-CA4C36CD6E16}"/>
+          <p:cNvPr id="29" name="Grafik 28">
+            <a:extLst>
+              <a:ext uri="{FF2B5EF4-FFF2-40B4-BE49-F238E27FC236}">
+                <a16:creationId xmlns:a16="http://schemas.microsoft.com/office/drawing/2014/main" id="{351E1D6B-8C58-E938-5AB5-C4617A450C84}"/>
               </a:ext>
             </a:extLst>
           </p:cNvPr>
@@ -3060,8 +4035,8 @@
         </p:blipFill>
         <p:spPr>
           <a:xfrm>
-            <a:off x="1723678" y="183868"/>
-            <a:ext cx="2593253" cy="1665918"/>
+            <a:off x="7165178" y="346273"/>
+            <a:ext cx="2942857" cy="1838095"/>
           </a:xfrm>
           <a:prstGeom prst="rect">
             <a:avLst/>
@@ -3070,10 +4045,10 @@
       </p:pic>
       <p:pic>
         <p:nvPicPr>
-          <p:cNvPr id="6" name="Grafik 5">
-            <a:extLst>
-              <a:ext uri="{FF2B5EF4-FFF2-40B4-BE49-F238E27FC236}">
-                <a16:creationId xmlns:a16="http://schemas.microsoft.com/office/drawing/2014/main" id="{73B7A236-8144-B638-A505-9DA7FCC381F1}"/>
+          <p:cNvPr id="31" name="Grafik 30">
+            <a:extLst>
+              <a:ext uri="{FF2B5EF4-FFF2-40B4-BE49-F238E27FC236}">
+                <a16:creationId xmlns:a16="http://schemas.microsoft.com/office/drawing/2014/main" id="{F5B4C2B2-C2AE-12FB-5891-DED8FB8FBD69}"/>
               </a:ext>
             </a:extLst>
           </p:cNvPr>
@@ -3090,989 +4065,14 @@
         </p:blipFill>
         <p:spPr>
           <a:xfrm>
-            <a:off x="7339981" y="175884"/>
-            <a:ext cx="2593253" cy="1681886"/>
+            <a:off x="1524375" y="393867"/>
+            <a:ext cx="2961905" cy="1847619"/>
           </a:xfrm>
           <a:prstGeom prst="rect">
             <a:avLst/>
           </a:prstGeom>
         </p:spPr>
       </p:pic>
-      <p:sp>
-        <p:nvSpPr>
-          <p:cNvPr id="7" name="Rechteck 6">
-            <a:extLst>
-              <a:ext uri="{FF2B5EF4-FFF2-40B4-BE49-F238E27FC236}">
-                <a16:creationId xmlns:a16="http://schemas.microsoft.com/office/drawing/2014/main" id="{9A61A60D-2FDE-533A-B5F4-429239D11023}"/>
-              </a:ext>
-            </a:extLst>
-          </p:cNvPr>
-          <p:cNvSpPr/>
-          <p:nvPr/>
-        </p:nvSpPr>
-        <p:spPr>
-          <a:xfrm>
-            <a:off x="6676743" y="2062996"/>
-            <a:ext cx="3919728" cy="2996684"/>
-          </a:xfrm>
-          <a:prstGeom prst="rect">
-            <a:avLst/>
-          </a:prstGeom>
-          <a:noFill/>
-          <a:ln>
-            <a:solidFill>
-              <a:schemeClr val="tx1"/>
-            </a:solidFill>
-          </a:ln>
-        </p:spPr>
-        <p:style>
-          <a:lnRef idx="2">
-            <a:schemeClr val="accent1">
-              <a:shade val="50000"/>
-            </a:schemeClr>
-          </a:lnRef>
-          <a:fillRef idx="1">
-            <a:schemeClr val="accent1"/>
-          </a:fillRef>
-          <a:effectRef idx="0">
-            <a:schemeClr val="accent1"/>
-          </a:effectRef>
-          <a:fontRef idx="minor">
-            <a:schemeClr val="lt1"/>
-          </a:fontRef>
-        </p:style>
-        <p:txBody>
-          <a:bodyPr rtlCol="0" anchor="ctr"/>
-          <a:lstStyle/>
-          <a:p>
-            <a:pPr algn="ctr"/>
-            <a:endParaRPr lang="de-CH" sz="1000" b="1" dirty="0">
-              <a:solidFill>
-                <a:schemeClr val="tx1"/>
-              </a:solidFill>
-              <a:latin typeface="Arial" panose="020B0604020202020204" pitchFamily="34" charset="0"/>
-              <a:cs typeface="Arial" panose="020B0604020202020204" pitchFamily="34" charset="0"/>
-            </a:endParaRPr>
-          </a:p>
-        </p:txBody>
-      </p:sp>
-      <p:sp>
-        <p:nvSpPr>
-          <p:cNvPr id="8" name="Textfeld 7">
-            <a:extLst>
-              <a:ext uri="{FF2B5EF4-FFF2-40B4-BE49-F238E27FC236}">
-                <a16:creationId xmlns:a16="http://schemas.microsoft.com/office/drawing/2014/main" id="{EEDEF138-DEC4-FA23-EFBD-977AE97D8DB3}"/>
-              </a:ext>
-            </a:extLst>
-          </p:cNvPr>
-          <p:cNvSpPr txBox="1"/>
-          <p:nvPr/>
-        </p:nvSpPr>
-        <p:spPr>
-          <a:xfrm>
-            <a:off x="1036319" y="2166628"/>
-            <a:ext cx="2593253" cy="230832"/>
-          </a:xfrm>
-          <a:prstGeom prst="rect">
-            <a:avLst/>
-          </a:prstGeom>
-          <a:noFill/>
-        </p:spPr>
-        <p:txBody>
-          <a:bodyPr wrap="square" rtlCol="0">
-            <a:spAutoFit/>
-          </a:bodyPr>
-          <a:lstStyle/>
-          <a:p>
-            <a:r>
-              <a:rPr lang="de-CH" sz="900" b="1" dirty="0" err="1">
-                <a:latin typeface="Arial" panose="020B0604020202020204" pitchFamily="34" charset="0"/>
-                <a:cs typeface="Arial" panose="020B0604020202020204" pitchFamily="34" charset="0"/>
-              </a:rPr>
-              <a:t>cl_div_supporter_card_front</a:t>
-            </a:r>
-            <a:r>
-              <a:rPr lang="de-CH" sz="900" b="1" dirty="0">
-                <a:latin typeface="Arial" panose="020B0604020202020204" pitchFamily="34" charset="0"/>
-                <a:cs typeface="Arial" panose="020B0604020202020204" pitchFamily="34" charset="0"/>
-              </a:rPr>
-              <a:t>  78 X 48 mm</a:t>
-            </a:r>
-          </a:p>
-        </p:txBody>
-      </p:sp>
-      <p:sp>
-        <p:nvSpPr>
-          <p:cNvPr id="9" name="Textfeld 8">
-            <a:extLst>
-              <a:ext uri="{FF2B5EF4-FFF2-40B4-BE49-F238E27FC236}">
-                <a16:creationId xmlns:a16="http://schemas.microsoft.com/office/drawing/2014/main" id="{63120305-67F4-1425-2085-63676B88AD87}"/>
-              </a:ext>
-            </a:extLst>
-          </p:cNvPr>
-          <p:cNvSpPr txBox="1"/>
-          <p:nvPr/>
-        </p:nvSpPr>
-        <p:spPr>
-          <a:xfrm>
-            <a:off x="6676742" y="2117860"/>
-            <a:ext cx="3076857" cy="230832"/>
-          </a:xfrm>
-          <a:prstGeom prst="rect">
-            <a:avLst/>
-          </a:prstGeom>
-          <a:noFill/>
-        </p:spPr>
-        <p:txBody>
-          <a:bodyPr wrap="square" rtlCol="0">
-            <a:spAutoFit/>
-          </a:bodyPr>
-          <a:lstStyle/>
-          <a:p>
-            <a:r>
-              <a:rPr lang="de-CH" sz="900" b="1" dirty="0" err="1">
-                <a:latin typeface="Arial" panose="020B0604020202020204" pitchFamily="34" charset="0"/>
-                <a:cs typeface="Arial" panose="020B0604020202020204" pitchFamily="34" charset="0"/>
-              </a:rPr>
-              <a:t>cl_div_supporter_card_reverse</a:t>
-            </a:r>
-            <a:r>
-              <a:rPr lang="de-CH" sz="900" b="1" dirty="0">
-                <a:latin typeface="Arial" panose="020B0604020202020204" pitchFamily="34" charset="0"/>
-                <a:cs typeface="Arial" panose="020B0604020202020204" pitchFamily="34" charset="0"/>
-              </a:rPr>
-              <a:t> 78 X 48 mm</a:t>
-            </a:r>
-          </a:p>
-        </p:txBody>
-      </p:sp>
-      <p:sp>
-        <p:nvSpPr>
-          <p:cNvPr id="10" name="Rechteck 9">
-            <a:extLst>
-              <a:ext uri="{FF2B5EF4-FFF2-40B4-BE49-F238E27FC236}">
-                <a16:creationId xmlns:a16="http://schemas.microsoft.com/office/drawing/2014/main" id="{81AD996F-B251-9CE6-29DE-D6A21FC4B5C0}"/>
-              </a:ext>
-            </a:extLst>
-          </p:cNvPr>
-          <p:cNvSpPr/>
-          <p:nvPr/>
-        </p:nvSpPr>
-        <p:spPr>
-          <a:xfrm>
-            <a:off x="1146048" y="2453140"/>
-            <a:ext cx="3718560" cy="310122"/>
-          </a:xfrm>
-          <a:prstGeom prst="rect">
-            <a:avLst/>
-          </a:prstGeom>
-          <a:noFill/>
-          <a:ln>
-            <a:solidFill>
-              <a:schemeClr val="tx1"/>
-            </a:solidFill>
-          </a:ln>
-        </p:spPr>
-        <p:style>
-          <a:lnRef idx="2">
-            <a:schemeClr val="accent1">
-              <a:shade val="50000"/>
-            </a:schemeClr>
-          </a:lnRef>
-          <a:fillRef idx="1">
-            <a:schemeClr val="accent1"/>
-          </a:fillRef>
-          <a:effectRef idx="0">
-            <a:schemeClr val="accent1"/>
-          </a:effectRef>
-          <a:fontRef idx="minor">
-            <a:schemeClr val="lt1"/>
-          </a:fontRef>
-        </p:style>
-        <p:txBody>
-          <a:bodyPr rtlCol="0" anchor="ctr"/>
-          <a:lstStyle/>
-          <a:p>
-            <a:pPr algn="ctr"/>
-            <a:endParaRPr lang="de-CH" sz="1000" b="1" dirty="0">
-              <a:solidFill>
-                <a:schemeClr val="tx1"/>
-              </a:solidFill>
-              <a:latin typeface="Arial" panose="020B0604020202020204" pitchFamily="34" charset="0"/>
-              <a:cs typeface="Arial" panose="020B0604020202020204" pitchFamily="34" charset="0"/>
-            </a:endParaRPr>
-          </a:p>
-        </p:txBody>
-      </p:sp>
-      <p:sp>
-        <p:nvSpPr>
-          <p:cNvPr id="11" name="Textfeld 10">
-            <a:extLst>
-              <a:ext uri="{FF2B5EF4-FFF2-40B4-BE49-F238E27FC236}">
-                <a16:creationId xmlns:a16="http://schemas.microsoft.com/office/drawing/2014/main" id="{2726B3D1-0C78-E55A-EEB0-419BFB8D98DE}"/>
-              </a:ext>
-            </a:extLst>
-          </p:cNvPr>
-          <p:cNvSpPr txBox="1"/>
-          <p:nvPr/>
-        </p:nvSpPr>
-        <p:spPr>
-          <a:xfrm>
-            <a:off x="1111889" y="2431346"/>
-            <a:ext cx="2593253" cy="230832"/>
-          </a:xfrm>
-          <a:prstGeom prst="rect">
-            <a:avLst/>
-          </a:prstGeom>
-          <a:noFill/>
-        </p:spPr>
-        <p:txBody>
-          <a:bodyPr wrap="square" rtlCol="0">
-            <a:spAutoFit/>
-          </a:bodyPr>
-          <a:lstStyle/>
-          <a:p>
-            <a:r>
-              <a:rPr lang="de-CH" sz="900" b="1" dirty="0">
-                <a:latin typeface="Arial" panose="020B0604020202020204" pitchFamily="34" charset="0"/>
-                <a:cs typeface="Arial" panose="020B0604020202020204" pitchFamily="34" charset="0"/>
-              </a:rPr>
-              <a:t>cl_div_supporter</a:t>
-            </a:r>
-            <a:r>
-              <a:rPr lang="de-CH" sz="900" b="1">
-                <a:latin typeface="Arial" panose="020B0604020202020204" pitchFamily="34" charset="0"/>
-                <a:cs typeface="Arial" panose="020B0604020202020204" pitchFamily="34" charset="0"/>
-              </a:rPr>
-              <a:t>_card_</a:t>
-            </a:r>
-            <a:r>
-              <a:rPr lang="de-CH" sz="900" b="1" dirty="0" err="1">
-                <a:latin typeface="Arial" panose="020B0604020202020204" pitchFamily="34" charset="0"/>
-                <a:cs typeface="Arial" panose="020B0604020202020204" pitchFamily="34" charset="0"/>
-              </a:rPr>
-              <a:t>logo</a:t>
-            </a:r>
-            <a:endParaRPr lang="de-CH" sz="900" b="1" dirty="0">
-              <a:latin typeface="Arial" panose="020B0604020202020204" pitchFamily="34" charset="0"/>
-              <a:cs typeface="Arial" panose="020B0604020202020204" pitchFamily="34" charset="0"/>
-            </a:endParaRPr>
-          </a:p>
-        </p:txBody>
-      </p:sp>
-      <p:sp>
-        <p:nvSpPr>
-          <p:cNvPr id="12" name="Rechteck 11">
-            <a:extLst>
-              <a:ext uri="{FF2B5EF4-FFF2-40B4-BE49-F238E27FC236}">
-                <a16:creationId xmlns:a16="http://schemas.microsoft.com/office/drawing/2014/main" id="{5B63D0F0-5E43-37A3-6DCE-E1B835A25B4C}"/>
-              </a:ext>
-            </a:extLst>
-          </p:cNvPr>
-          <p:cNvSpPr/>
-          <p:nvPr/>
-        </p:nvSpPr>
-        <p:spPr>
-          <a:xfrm>
-            <a:off x="1161024" y="2811030"/>
-            <a:ext cx="3718560" cy="310122"/>
-          </a:xfrm>
-          <a:prstGeom prst="rect">
-            <a:avLst/>
-          </a:prstGeom>
-          <a:noFill/>
-          <a:ln>
-            <a:solidFill>
-              <a:schemeClr val="tx1"/>
-            </a:solidFill>
-          </a:ln>
-        </p:spPr>
-        <p:style>
-          <a:lnRef idx="2">
-            <a:schemeClr val="accent1">
-              <a:shade val="50000"/>
-            </a:schemeClr>
-          </a:lnRef>
-          <a:fillRef idx="1">
-            <a:schemeClr val="accent1"/>
-          </a:fillRef>
-          <a:effectRef idx="0">
-            <a:schemeClr val="accent1"/>
-          </a:effectRef>
-          <a:fontRef idx="minor">
-            <a:schemeClr val="lt1"/>
-          </a:fontRef>
-        </p:style>
-        <p:txBody>
-          <a:bodyPr rtlCol="0" anchor="ctr"/>
-          <a:lstStyle/>
-          <a:p>
-            <a:pPr algn="ctr"/>
-            <a:endParaRPr lang="de-CH" sz="1000" b="1" dirty="0">
-              <a:solidFill>
-                <a:schemeClr val="tx1"/>
-              </a:solidFill>
-              <a:latin typeface="Arial" panose="020B0604020202020204" pitchFamily="34" charset="0"/>
-              <a:cs typeface="Arial" panose="020B0604020202020204" pitchFamily="34" charset="0"/>
-            </a:endParaRPr>
-          </a:p>
-        </p:txBody>
-      </p:sp>
-      <p:sp>
-        <p:nvSpPr>
-          <p:cNvPr id="13" name="Textfeld 12">
-            <a:extLst>
-              <a:ext uri="{FF2B5EF4-FFF2-40B4-BE49-F238E27FC236}">
-                <a16:creationId xmlns:a16="http://schemas.microsoft.com/office/drawing/2014/main" id="{9A9CCC90-41D9-F167-F613-3F072FAA5BF9}"/>
-              </a:ext>
-            </a:extLst>
-          </p:cNvPr>
-          <p:cNvSpPr txBox="1"/>
-          <p:nvPr/>
-        </p:nvSpPr>
-        <p:spPr>
-          <a:xfrm>
-            <a:off x="1161024" y="2792742"/>
-            <a:ext cx="2593253" cy="230832"/>
-          </a:xfrm>
-          <a:prstGeom prst="rect">
-            <a:avLst/>
-          </a:prstGeom>
-          <a:noFill/>
-        </p:spPr>
-        <p:txBody>
-          <a:bodyPr wrap="square" rtlCol="0">
-            <a:spAutoFit/>
-          </a:bodyPr>
-          <a:lstStyle/>
-          <a:p>
-            <a:r>
-              <a:rPr lang="de-CH" sz="900" b="1" dirty="0" err="1">
-                <a:latin typeface="Arial" panose="020B0604020202020204" pitchFamily="34" charset="0"/>
-                <a:cs typeface="Arial" panose="020B0604020202020204" pitchFamily="34" charset="0"/>
-              </a:rPr>
-              <a:t>cl_div_supporter_card_name</a:t>
-            </a:r>
-            <a:endParaRPr lang="de-CH" sz="900" b="1" dirty="0">
-              <a:latin typeface="Arial" panose="020B0604020202020204" pitchFamily="34" charset="0"/>
-              <a:cs typeface="Arial" panose="020B0604020202020204" pitchFamily="34" charset="0"/>
-            </a:endParaRPr>
-          </a:p>
-        </p:txBody>
-      </p:sp>
-      <p:sp>
-        <p:nvSpPr>
-          <p:cNvPr id="14" name="Rechteck 13">
-            <a:extLst>
-              <a:ext uri="{FF2B5EF4-FFF2-40B4-BE49-F238E27FC236}">
-                <a16:creationId xmlns:a16="http://schemas.microsoft.com/office/drawing/2014/main" id="{5A1230E4-8BEB-584B-8EDC-3CEDD409232D}"/>
-              </a:ext>
-            </a:extLst>
-          </p:cNvPr>
-          <p:cNvSpPr/>
-          <p:nvPr/>
-        </p:nvSpPr>
-        <p:spPr>
-          <a:xfrm>
-            <a:off x="1161024" y="3161987"/>
-            <a:ext cx="3718560" cy="1794061"/>
-          </a:xfrm>
-          <a:prstGeom prst="rect">
-            <a:avLst/>
-          </a:prstGeom>
-          <a:noFill/>
-          <a:ln>
-            <a:solidFill>
-              <a:schemeClr val="tx1"/>
-            </a:solidFill>
-          </a:ln>
-        </p:spPr>
-        <p:style>
-          <a:lnRef idx="2">
-            <a:schemeClr val="accent1">
-              <a:shade val="50000"/>
-            </a:schemeClr>
-          </a:lnRef>
-          <a:fillRef idx="1">
-            <a:schemeClr val="accent1"/>
-          </a:fillRef>
-          <a:effectRef idx="0">
-            <a:schemeClr val="accent1"/>
-          </a:effectRef>
-          <a:fontRef idx="minor">
-            <a:schemeClr val="lt1"/>
-          </a:fontRef>
-        </p:style>
-        <p:txBody>
-          <a:bodyPr rtlCol="0" anchor="ctr"/>
-          <a:lstStyle/>
-          <a:p>
-            <a:pPr algn="ctr"/>
-            <a:endParaRPr lang="de-CH" sz="1000" b="1" dirty="0">
-              <a:solidFill>
-                <a:schemeClr val="tx1"/>
-              </a:solidFill>
-              <a:latin typeface="Arial" panose="020B0604020202020204" pitchFamily="34" charset="0"/>
-              <a:cs typeface="Arial" panose="020B0604020202020204" pitchFamily="34" charset="0"/>
-            </a:endParaRPr>
-          </a:p>
-        </p:txBody>
-      </p:sp>
-      <p:sp>
-        <p:nvSpPr>
-          <p:cNvPr id="15" name="Textfeld 14">
-            <a:extLst>
-              <a:ext uri="{FF2B5EF4-FFF2-40B4-BE49-F238E27FC236}">
-                <a16:creationId xmlns:a16="http://schemas.microsoft.com/office/drawing/2014/main" id="{D6325553-BC9E-E12F-9A05-9A61D3BF051D}"/>
-              </a:ext>
-            </a:extLst>
-          </p:cNvPr>
-          <p:cNvSpPr txBox="1"/>
-          <p:nvPr/>
-        </p:nvSpPr>
-        <p:spPr>
-          <a:xfrm>
-            <a:off x="1161024" y="3161987"/>
-            <a:ext cx="2593253" cy="230832"/>
-          </a:xfrm>
-          <a:prstGeom prst="rect">
-            <a:avLst/>
-          </a:prstGeom>
-          <a:noFill/>
-        </p:spPr>
-        <p:txBody>
-          <a:bodyPr wrap="square" rtlCol="0">
-            <a:spAutoFit/>
-          </a:bodyPr>
-          <a:lstStyle/>
-          <a:p>
-            <a:r>
-              <a:rPr lang="de-CH" sz="900" b="1" dirty="0" err="1">
-                <a:latin typeface="Arial" panose="020B0604020202020204" pitchFamily="34" charset="0"/>
-                <a:cs typeface="Arial" panose="020B0604020202020204" pitchFamily="34" charset="0"/>
-              </a:rPr>
-              <a:t>cl_div_supporter_card_text_canvas</a:t>
-            </a:r>
-            <a:endParaRPr lang="de-CH" sz="900" b="1" dirty="0">
-              <a:latin typeface="Arial" panose="020B0604020202020204" pitchFamily="34" charset="0"/>
-              <a:cs typeface="Arial" panose="020B0604020202020204" pitchFamily="34" charset="0"/>
-            </a:endParaRPr>
-          </a:p>
-        </p:txBody>
-      </p:sp>
-      <p:sp>
-        <p:nvSpPr>
-          <p:cNvPr id="16" name="Rechteck 15">
-            <a:extLst>
-              <a:ext uri="{FF2B5EF4-FFF2-40B4-BE49-F238E27FC236}">
-                <a16:creationId xmlns:a16="http://schemas.microsoft.com/office/drawing/2014/main" id="{2BC134D5-E1BD-66DD-C017-5B238538DEBA}"/>
-              </a:ext>
-            </a:extLst>
-          </p:cNvPr>
-          <p:cNvSpPr/>
-          <p:nvPr/>
-        </p:nvSpPr>
-        <p:spPr>
-          <a:xfrm>
-            <a:off x="1221984" y="3447288"/>
-            <a:ext cx="1576080" cy="1411224"/>
-          </a:xfrm>
-          <a:prstGeom prst="rect">
-            <a:avLst/>
-          </a:prstGeom>
-          <a:noFill/>
-          <a:ln>
-            <a:solidFill>
-              <a:schemeClr val="tx1"/>
-            </a:solidFill>
-          </a:ln>
-        </p:spPr>
-        <p:style>
-          <a:lnRef idx="2">
-            <a:schemeClr val="accent1">
-              <a:shade val="50000"/>
-            </a:schemeClr>
-          </a:lnRef>
-          <a:fillRef idx="1">
-            <a:schemeClr val="accent1"/>
-          </a:fillRef>
-          <a:effectRef idx="0">
-            <a:schemeClr val="accent1"/>
-          </a:effectRef>
-          <a:fontRef idx="minor">
-            <a:schemeClr val="lt1"/>
-          </a:fontRef>
-        </p:style>
-        <p:txBody>
-          <a:bodyPr rtlCol="0" anchor="ctr"/>
-          <a:lstStyle/>
-          <a:p>
-            <a:pPr algn="ctr"/>
-            <a:endParaRPr lang="de-CH" sz="1000" b="1" dirty="0">
-              <a:solidFill>
-                <a:schemeClr val="tx1"/>
-              </a:solidFill>
-              <a:latin typeface="Arial" panose="020B0604020202020204" pitchFamily="34" charset="0"/>
-              <a:cs typeface="Arial" panose="020B0604020202020204" pitchFamily="34" charset="0"/>
-            </a:endParaRPr>
-          </a:p>
-        </p:txBody>
-      </p:sp>
-      <p:sp>
-        <p:nvSpPr>
-          <p:cNvPr id="17" name="Rechteck 16">
-            <a:extLst>
-              <a:ext uri="{FF2B5EF4-FFF2-40B4-BE49-F238E27FC236}">
-                <a16:creationId xmlns:a16="http://schemas.microsoft.com/office/drawing/2014/main" id="{BA89520A-F0EE-1C0C-417B-BDBE4EE933DF}"/>
-              </a:ext>
-            </a:extLst>
-          </p:cNvPr>
-          <p:cNvSpPr/>
-          <p:nvPr/>
-        </p:nvSpPr>
-        <p:spPr>
-          <a:xfrm>
-            <a:off x="2855712" y="3441191"/>
-            <a:ext cx="1946280" cy="1411224"/>
-          </a:xfrm>
-          <a:prstGeom prst="rect">
-            <a:avLst/>
-          </a:prstGeom>
-          <a:noFill/>
-          <a:ln>
-            <a:solidFill>
-              <a:schemeClr val="tx1"/>
-            </a:solidFill>
-          </a:ln>
-        </p:spPr>
-        <p:style>
-          <a:lnRef idx="2">
-            <a:schemeClr val="accent1">
-              <a:shade val="50000"/>
-            </a:schemeClr>
-          </a:lnRef>
-          <a:fillRef idx="1">
-            <a:schemeClr val="accent1"/>
-          </a:fillRef>
-          <a:effectRef idx="0">
-            <a:schemeClr val="accent1"/>
-          </a:effectRef>
-          <a:fontRef idx="minor">
-            <a:schemeClr val="lt1"/>
-          </a:fontRef>
-        </p:style>
-        <p:txBody>
-          <a:bodyPr rtlCol="0" anchor="ctr"/>
-          <a:lstStyle/>
-          <a:p>
-            <a:pPr algn="ctr"/>
-            <a:endParaRPr lang="de-CH" sz="1000" b="1" dirty="0">
-              <a:solidFill>
-                <a:schemeClr val="tx1"/>
-              </a:solidFill>
-              <a:latin typeface="Arial" panose="020B0604020202020204" pitchFamily="34" charset="0"/>
-              <a:cs typeface="Arial" panose="020B0604020202020204" pitchFamily="34" charset="0"/>
-            </a:endParaRPr>
-          </a:p>
-        </p:txBody>
-      </p:sp>
-      <p:sp>
-        <p:nvSpPr>
-          <p:cNvPr id="18" name="Textfeld 17">
-            <a:extLst>
-              <a:ext uri="{FF2B5EF4-FFF2-40B4-BE49-F238E27FC236}">
-                <a16:creationId xmlns:a16="http://schemas.microsoft.com/office/drawing/2014/main" id="{2C9233CF-6A0D-A5F0-B64A-6A84376F43B1}"/>
-              </a:ext>
-            </a:extLst>
-          </p:cNvPr>
-          <p:cNvSpPr txBox="1"/>
-          <p:nvPr/>
-        </p:nvSpPr>
-        <p:spPr>
-          <a:xfrm>
-            <a:off x="1154929" y="3457227"/>
-            <a:ext cx="1901952" cy="230832"/>
-          </a:xfrm>
-          <a:prstGeom prst="rect">
-            <a:avLst/>
-          </a:prstGeom>
-          <a:noFill/>
-        </p:spPr>
-        <p:txBody>
-          <a:bodyPr wrap="square" rtlCol="0">
-            <a:spAutoFit/>
-          </a:bodyPr>
-          <a:lstStyle/>
-          <a:p>
-            <a:r>
-              <a:rPr lang="de-CH" sz="900" b="1" dirty="0" err="1">
-                <a:latin typeface="Arial" panose="020B0604020202020204" pitchFamily="34" charset="0"/>
-                <a:cs typeface="Arial" panose="020B0604020202020204" pitchFamily="34" charset="0"/>
-              </a:rPr>
-              <a:t>cl_div_supporter_card_text</a:t>
-            </a:r>
-            <a:endParaRPr lang="de-CH" sz="900" b="1" dirty="0">
-              <a:latin typeface="Arial" panose="020B0604020202020204" pitchFamily="34" charset="0"/>
-              <a:cs typeface="Arial" panose="020B0604020202020204" pitchFamily="34" charset="0"/>
-            </a:endParaRPr>
-          </a:p>
-        </p:txBody>
-      </p:sp>
-      <p:sp>
-        <p:nvSpPr>
-          <p:cNvPr id="19" name="Textfeld 18">
-            <a:extLst>
-              <a:ext uri="{FF2B5EF4-FFF2-40B4-BE49-F238E27FC236}">
-                <a16:creationId xmlns:a16="http://schemas.microsoft.com/office/drawing/2014/main" id="{108C5F41-34C2-7E6F-EA11-E7A18353F18E}"/>
-              </a:ext>
-            </a:extLst>
-          </p:cNvPr>
-          <p:cNvSpPr txBox="1"/>
-          <p:nvPr/>
-        </p:nvSpPr>
-        <p:spPr>
-          <a:xfrm>
-            <a:off x="2805816" y="3423149"/>
-            <a:ext cx="2198472" cy="230832"/>
-          </a:xfrm>
-          <a:prstGeom prst="rect">
-            <a:avLst/>
-          </a:prstGeom>
-          <a:noFill/>
-        </p:spPr>
-        <p:txBody>
-          <a:bodyPr wrap="square" rtlCol="0">
-            <a:spAutoFit/>
-          </a:bodyPr>
-          <a:lstStyle/>
-          <a:p>
-            <a:r>
-              <a:rPr lang="de-CH" sz="900" b="1" dirty="0" err="1">
-                <a:latin typeface="Arial" panose="020B0604020202020204" pitchFamily="34" charset="0"/>
-                <a:cs typeface="Arial" panose="020B0604020202020204" pitchFamily="34" charset="0"/>
-              </a:rPr>
-              <a:t>cl_div_supporter_card_qr_canvas</a:t>
-            </a:r>
-            <a:endParaRPr lang="de-CH" sz="900" b="1" dirty="0">
-              <a:latin typeface="Arial" panose="020B0604020202020204" pitchFamily="34" charset="0"/>
-              <a:cs typeface="Arial" panose="020B0604020202020204" pitchFamily="34" charset="0"/>
-            </a:endParaRPr>
-          </a:p>
-        </p:txBody>
-      </p:sp>
-      <p:sp>
-        <p:nvSpPr>
-          <p:cNvPr id="20" name="Rechteck 19">
-            <a:extLst>
-              <a:ext uri="{FF2B5EF4-FFF2-40B4-BE49-F238E27FC236}">
-                <a16:creationId xmlns:a16="http://schemas.microsoft.com/office/drawing/2014/main" id="{8E6C58B6-A689-554D-A1C0-8C3695019631}"/>
-              </a:ext>
-            </a:extLst>
-          </p:cNvPr>
-          <p:cNvSpPr/>
-          <p:nvPr/>
-        </p:nvSpPr>
-        <p:spPr>
-          <a:xfrm>
-            <a:off x="2922767" y="3690556"/>
-            <a:ext cx="1791845" cy="1082612"/>
-          </a:xfrm>
-          <a:prstGeom prst="rect">
-            <a:avLst/>
-          </a:prstGeom>
-          <a:noFill/>
-          <a:ln>
-            <a:solidFill>
-              <a:schemeClr val="tx1"/>
-            </a:solidFill>
-          </a:ln>
-        </p:spPr>
-        <p:style>
-          <a:lnRef idx="2">
-            <a:schemeClr val="accent1">
-              <a:shade val="50000"/>
-            </a:schemeClr>
-          </a:lnRef>
-          <a:fillRef idx="1">
-            <a:schemeClr val="accent1"/>
-          </a:fillRef>
-          <a:effectRef idx="0">
-            <a:schemeClr val="accent1"/>
-          </a:effectRef>
-          <a:fontRef idx="minor">
-            <a:schemeClr val="lt1"/>
-          </a:fontRef>
-        </p:style>
-        <p:txBody>
-          <a:bodyPr rtlCol="0" anchor="ctr"/>
-          <a:lstStyle/>
-          <a:p>
-            <a:pPr algn="ctr"/>
-            <a:endParaRPr lang="de-CH" sz="1000" b="1" dirty="0">
-              <a:solidFill>
-                <a:schemeClr val="tx1"/>
-              </a:solidFill>
-              <a:latin typeface="Arial" panose="020B0604020202020204" pitchFamily="34" charset="0"/>
-              <a:cs typeface="Arial" panose="020B0604020202020204" pitchFamily="34" charset="0"/>
-            </a:endParaRPr>
-          </a:p>
-        </p:txBody>
-      </p:sp>
-      <p:sp>
-        <p:nvSpPr>
-          <p:cNvPr id="21" name="Textfeld 20">
-            <a:extLst>
-              <a:ext uri="{FF2B5EF4-FFF2-40B4-BE49-F238E27FC236}">
-                <a16:creationId xmlns:a16="http://schemas.microsoft.com/office/drawing/2014/main" id="{E34F62EE-6928-CB73-C959-0165B47D20CE}"/>
-              </a:ext>
-            </a:extLst>
-          </p:cNvPr>
-          <p:cNvSpPr txBox="1"/>
-          <p:nvPr/>
-        </p:nvSpPr>
-        <p:spPr>
-          <a:xfrm>
-            <a:off x="2876184" y="3728894"/>
-            <a:ext cx="1988424" cy="369332"/>
-          </a:xfrm>
-          <a:prstGeom prst="rect">
-            <a:avLst/>
-          </a:prstGeom>
-          <a:noFill/>
-        </p:spPr>
-        <p:txBody>
-          <a:bodyPr wrap="square" rtlCol="0">
-            <a:spAutoFit/>
-          </a:bodyPr>
-          <a:lstStyle/>
-          <a:p>
-            <a:r>
-              <a:rPr lang="de-CH" sz="900" b="1" dirty="0" err="1">
-                <a:latin typeface="Arial" panose="020B0604020202020204" pitchFamily="34" charset="0"/>
-                <a:cs typeface="Arial" panose="020B0604020202020204" pitchFamily="34" charset="0"/>
-              </a:rPr>
-              <a:t>id_supporter_card_qr_canvas</a:t>
-            </a:r>
-            <a:endParaRPr lang="de-CH" sz="900" b="1" dirty="0">
-              <a:latin typeface="Arial" panose="020B0604020202020204" pitchFamily="34" charset="0"/>
-              <a:cs typeface="Arial" panose="020B0604020202020204" pitchFamily="34" charset="0"/>
-            </a:endParaRPr>
-          </a:p>
-          <a:p>
-            <a:r>
-              <a:rPr lang="de-CH" sz="900" b="1" dirty="0" err="1">
-                <a:latin typeface="Arial" panose="020B0604020202020204" pitchFamily="34" charset="0"/>
-                <a:cs typeface="Arial" panose="020B0604020202020204" pitchFamily="34" charset="0"/>
-              </a:rPr>
-              <a:t>cl_supporter_card_qr_canvas</a:t>
-            </a:r>
-            <a:endParaRPr lang="de-CH" sz="900" b="1" dirty="0">
-              <a:latin typeface="Arial" panose="020B0604020202020204" pitchFamily="34" charset="0"/>
-              <a:cs typeface="Arial" panose="020B0604020202020204" pitchFamily="34" charset="0"/>
-            </a:endParaRPr>
-          </a:p>
-        </p:txBody>
-      </p:sp>
-      <p:sp>
-        <p:nvSpPr>
-          <p:cNvPr id="22" name="Rechteck 21">
-            <a:extLst>
-              <a:ext uri="{FF2B5EF4-FFF2-40B4-BE49-F238E27FC236}">
-                <a16:creationId xmlns:a16="http://schemas.microsoft.com/office/drawing/2014/main" id="{DAA13049-6140-1AD7-9768-53AAF04F3D24}"/>
-              </a:ext>
-            </a:extLst>
-          </p:cNvPr>
-          <p:cNvSpPr/>
-          <p:nvPr/>
-        </p:nvSpPr>
-        <p:spPr>
-          <a:xfrm>
-            <a:off x="6801447" y="2348691"/>
-            <a:ext cx="3701961" cy="1108535"/>
-          </a:xfrm>
-          <a:prstGeom prst="rect">
-            <a:avLst/>
-          </a:prstGeom>
-          <a:noFill/>
-          <a:ln>
-            <a:solidFill>
-              <a:schemeClr val="tx1"/>
-            </a:solidFill>
-          </a:ln>
-        </p:spPr>
-        <p:style>
-          <a:lnRef idx="2">
-            <a:schemeClr val="accent1">
-              <a:shade val="50000"/>
-            </a:schemeClr>
-          </a:lnRef>
-          <a:fillRef idx="1">
-            <a:schemeClr val="accent1"/>
-          </a:fillRef>
-          <a:effectRef idx="0">
-            <a:schemeClr val="accent1"/>
-          </a:effectRef>
-          <a:fontRef idx="minor">
-            <a:schemeClr val="lt1"/>
-          </a:fontRef>
-        </p:style>
-        <p:txBody>
-          <a:bodyPr rtlCol="0" anchor="ctr"/>
-          <a:lstStyle/>
-          <a:p>
-            <a:pPr algn="ctr"/>
-            <a:endParaRPr lang="de-CH" sz="1000" b="1" dirty="0">
-              <a:solidFill>
-                <a:schemeClr val="tx1"/>
-              </a:solidFill>
-              <a:latin typeface="Arial" panose="020B0604020202020204" pitchFamily="34" charset="0"/>
-              <a:cs typeface="Arial" panose="020B0604020202020204" pitchFamily="34" charset="0"/>
-            </a:endParaRPr>
-          </a:p>
-        </p:txBody>
-      </p:sp>
-      <p:sp>
-        <p:nvSpPr>
-          <p:cNvPr id="23" name="Textfeld 22">
-            <a:extLst>
-              <a:ext uri="{FF2B5EF4-FFF2-40B4-BE49-F238E27FC236}">
-                <a16:creationId xmlns:a16="http://schemas.microsoft.com/office/drawing/2014/main" id="{B450436E-9A0B-D1FD-9C1B-F3CDC49918AD}"/>
-              </a:ext>
-            </a:extLst>
-          </p:cNvPr>
-          <p:cNvSpPr txBox="1"/>
-          <p:nvPr/>
-        </p:nvSpPr>
-        <p:spPr>
-          <a:xfrm>
-            <a:off x="6752313" y="2397460"/>
-            <a:ext cx="3076857" cy="230832"/>
-          </a:xfrm>
-          <a:prstGeom prst="rect">
-            <a:avLst/>
-          </a:prstGeom>
-          <a:noFill/>
-        </p:spPr>
-        <p:txBody>
-          <a:bodyPr wrap="square" rtlCol="0">
-            <a:spAutoFit/>
-          </a:bodyPr>
-          <a:lstStyle/>
-          <a:p>
-            <a:r>
-              <a:rPr lang="de-CH" sz="900" b="1" dirty="0" err="1">
-                <a:latin typeface="Arial" panose="020B0604020202020204" pitchFamily="34" charset="0"/>
-                <a:cs typeface="Arial" panose="020B0604020202020204" pitchFamily="34" charset="0"/>
-              </a:rPr>
-              <a:t>cl_div_supporter_card_reverse_text</a:t>
-            </a:r>
-            <a:endParaRPr lang="de-CH" sz="900" b="1" dirty="0">
-              <a:latin typeface="Arial" panose="020B0604020202020204" pitchFamily="34" charset="0"/>
-              <a:cs typeface="Arial" panose="020B0604020202020204" pitchFamily="34" charset="0"/>
-            </a:endParaRPr>
-          </a:p>
-        </p:txBody>
-      </p:sp>
-      <p:sp>
-        <p:nvSpPr>
-          <p:cNvPr id="24" name="Rechteck 23">
-            <a:extLst>
-              <a:ext uri="{FF2B5EF4-FFF2-40B4-BE49-F238E27FC236}">
-                <a16:creationId xmlns:a16="http://schemas.microsoft.com/office/drawing/2014/main" id="{55097D92-56F1-9588-8019-B181B9291453}"/>
-              </a:ext>
-            </a:extLst>
-          </p:cNvPr>
-          <p:cNvSpPr/>
-          <p:nvPr/>
-        </p:nvSpPr>
-        <p:spPr>
-          <a:xfrm>
-            <a:off x="6801447" y="3608832"/>
-            <a:ext cx="3701961" cy="1310431"/>
-          </a:xfrm>
-          <a:prstGeom prst="rect">
-            <a:avLst/>
-          </a:prstGeom>
-          <a:noFill/>
-          <a:ln>
-            <a:solidFill>
-              <a:schemeClr val="tx1"/>
-            </a:solidFill>
-          </a:ln>
-        </p:spPr>
-        <p:style>
-          <a:lnRef idx="2">
-            <a:schemeClr val="accent1">
-              <a:shade val="50000"/>
-            </a:schemeClr>
-          </a:lnRef>
-          <a:fillRef idx="1">
-            <a:schemeClr val="accent1"/>
-          </a:fillRef>
-          <a:effectRef idx="0">
-            <a:schemeClr val="accent1"/>
-          </a:effectRef>
-          <a:fontRef idx="minor">
-            <a:schemeClr val="lt1"/>
-          </a:fontRef>
-        </p:style>
-        <p:txBody>
-          <a:bodyPr rtlCol="0" anchor="ctr"/>
-          <a:lstStyle/>
-          <a:p>
-            <a:pPr algn="ctr"/>
-            <a:endParaRPr lang="de-CH" sz="1000" b="1" dirty="0">
-              <a:solidFill>
-                <a:schemeClr val="tx1"/>
-              </a:solidFill>
-              <a:latin typeface="Arial" panose="020B0604020202020204" pitchFamily="34" charset="0"/>
-              <a:cs typeface="Arial" panose="020B0604020202020204" pitchFamily="34" charset="0"/>
-            </a:endParaRPr>
-          </a:p>
-        </p:txBody>
-      </p:sp>
-      <p:sp>
-        <p:nvSpPr>
-          <p:cNvPr id="25" name="Textfeld 24">
-            <a:extLst>
-              <a:ext uri="{FF2B5EF4-FFF2-40B4-BE49-F238E27FC236}">
-                <a16:creationId xmlns:a16="http://schemas.microsoft.com/office/drawing/2014/main" id="{9E0763B3-F99B-D9BA-CF1D-4595F5ABB37A}"/>
-              </a:ext>
-            </a:extLst>
-          </p:cNvPr>
-          <p:cNvSpPr txBox="1"/>
-          <p:nvPr/>
-        </p:nvSpPr>
-        <p:spPr>
-          <a:xfrm>
-            <a:off x="6801447" y="3682728"/>
-            <a:ext cx="3076857" cy="230832"/>
-          </a:xfrm>
-          <a:prstGeom prst="rect">
-            <a:avLst/>
-          </a:prstGeom>
-          <a:noFill/>
-        </p:spPr>
-        <p:txBody>
-          <a:bodyPr wrap="square" rtlCol="0">
-            <a:spAutoFit/>
-          </a:bodyPr>
-          <a:lstStyle/>
-          <a:p>
-            <a:r>
-              <a:rPr lang="de-CH" sz="900" b="1" dirty="0" err="1">
-                <a:latin typeface="Arial" panose="020B0604020202020204" pitchFamily="34" charset="0"/>
-                <a:cs typeface="Arial" panose="020B0604020202020204" pitchFamily="34" charset="0"/>
-              </a:rPr>
-              <a:t>cl_div_supporter_card_reverse_qr_show</a:t>
-            </a:r>
-            <a:endParaRPr lang="de-CH" sz="900" b="1" dirty="0">
-              <a:latin typeface="Arial" panose="020B0604020202020204" pitchFamily="34" charset="0"/>
-              <a:cs typeface="Arial" panose="020B0604020202020204" pitchFamily="34" charset="0"/>
-            </a:endParaRPr>
-          </a:p>
-        </p:txBody>
-      </p:sp>
     </p:spTree>
     <p:extLst>
       <p:ext uri="{BB962C8B-B14F-4D97-AF65-F5344CB8AC3E}">

</xml_diff>

<commit_message>
Message of your own
</commit_message>
<xml_diff>
--- a/Descriptions/WwwQrCodeImages.pptx
+++ b/Descriptions/WwwQrCodeImages.pptx
@@ -256,7 +256,7 @@
           <a:p>
             <a:fld id="{9A42C61D-D669-4B9E-81E6-AA43D08BFCD1}" type="datetimeFigureOut">
               <a:rPr lang="de-CH" smtClean="0"/>
-              <a:t>27.05.2022</a:t>
+              <a:t>28.05.2022</a:t>
             </a:fld>
             <a:endParaRPr lang="de-CH"/>
           </a:p>
@@ -426,7 +426,7 @@
           <a:p>
             <a:fld id="{9A42C61D-D669-4B9E-81E6-AA43D08BFCD1}" type="datetimeFigureOut">
               <a:rPr lang="de-CH" smtClean="0"/>
-              <a:t>27.05.2022</a:t>
+              <a:t>28.05.2022</a:t>
             </a:fld>
             <a:endParaRPr lang="de-CH"/>
           </a:p>
@@ -606,7 +606,7 @@
           <a:p>
             <a:fld id="{9A42C61D-D669-4B9E-81E6-AA43D08BFCD1}" type="datetimeFigureOut">
               <a:rPr lang="de-CH" smtClean="0"/>
-              <a:t>27.05.2022</a:t>
+              <a:t>28.05.2022</a:t>
             </a:fld>
             <a:endParaRPr lang="de-CH"/>
           </a:p>
@@ -776,7 +776,7 @@
           <a:p>
             <a:fld id="{9A42C61D-D669-4B9E-81E6-AA43D08BFCD1}" type="datetimeFigureOut">
               <a:rPr lang="de-CH" smtClean="0"/>
-              <a:t>27.05.2022</a:t>
+              <a:t>28.05.2022</a:t>
             </a:fld>
             <a:endParaRPr lang="de-CH"/>
           </a:p>
@@ -1022,7 +1022,7 @@
           <a:p>
             <a:fld id="{9A42C61D-D669-4B9E-81E6-AA43D08BFCD1}" type="datetimeFigureOut">
               <a:rPr lang="de-CH" smtClean="0"/>
-              <a:t>27.05.2022</a:t>
+              <a:t>28.05.2022</a:t>
             </a:fld>
             <a:endParaRPr lang="de-CH"/>
           </a:p>
@@ -1254,7 +1254,7 @@
           <a:p>
             <a:fld id="{9A42C61D-D669-4B9E-81E6-AA43D08BFCD1}" type="datetimeFigureOut">
               <a:rPr lang="de-CH" smtClean="0"/>
-              <a:t>27.05.2022</a:t>
+              <a:t>28.05.2022</a:t>
             </a:fld>
             <a:endParaRPr lang="de-CH"/>
           </a:p>
@@ -1621,7 +1621,7 @@
           <a:p>
             <a:fld id="{9A42C61D-D669-4B9E-81E6-AA43D08BFCD1}" type="datetimeFigureOut">
               <a:rPr lang="de-CH" smtClean="0"/>
-              <a:t>27.05.2022</a:t>
+              <a:t>28.05.2022</a:t>
             </a:fld>
             <a:endParaRPr lang="de-CH"/>
           </a:p>
@@ -1739,7 +1739,7 @@
           <a:p>
             <a:fld id="{9A42C61D-D669-4B9E-81E6-AA43D08BFCD1}" type="datetimeFigureOut">
               <a:rPr lang="de-CH" smtClean="0"/>
-              <a:t>27.05.2022</a:t>
+              <a:t>28.05.2022</a:t>
             </a:fld>
             <a:endParaRPr lang="de-CH"/>
           </a:p>
@@ -1834,7 +1834,7 @@
           <a:p>
             <a:fld id="{9A42C61D-D669-4B9E-81E6-AA43D08BFCD1}" type="datetimeFigureOut">
               <a:rPr lang="de-CH" smtClean="0"/>
-              <a:t>27.05.2022</a:t>
+              <a:t>28.05.2022</a:t>
             </a:fld>
             <a:endParaRPr lang="de-CH"/>
           </a:p>
@@ -2111,7 +2111,7 @@
           <a:p>
             <a:fld id="{9A42C61D-D669-4B9E-81E6-AA43D08BFCD1}" type="datetimeFigureOut">
               <a:rPr lang="de-CH" smtClean="0"/>
-              <a:t>27.05.2022</a:t>
+              <a:t>28.05.2022</a:t>
             </a:fld>
             <a:endParaRPr lang="de-CH"/>
           </a:p>
@@ -2364,7 +2364,7 @@
           <a:p>
             <a:fld id="{9A42C61D-D669-4B9E-81E6-AA43D08BFCD1}" type="datetimeFigureOut">
               <a:rPr lang="de-CH" smtClean="0"/>
-              <a:t>27.05.2022</a:t>
+              <a:t>28.05.2022</a:t>
             </a:fld>
             <a:endParaRPr lang="de-CH"/>
           </a:p>
@@ -2577,7 +2577,7 @@
           <a:p>
             <a:fld id="{9A42C61D-D669-4B9E-81E6-AA43D08BFCD1}" type="datetimeFigureOut">
               <a:rPr lang="de-CH" smtClean="0"/>
-              <a:t>27.05.2022</a:t>
+              <a:t>28.05.2022</a:t>
             </a:fld>
             <a:endParaRPr lang="de-CH"/>
           </a:p>
@@ -13252,7 +13252,7 @@
                 <a:latin typeface="Arial" panose="020B0604020202020204" pitchFamily="34" charset="0"/>
                 <a:cs typeface="Arial" panose="020B0604020202020204" pitchFamily="34" charset="0"/>
               </a:rPr>
-              <a:t>id_div_alt_one_msg</a:t>
+              <a:t>id_div_alt_one_message</a:t>
             </a:r>
             <a:r>
               <a:rPr lang="de-CH" sz="900" b="1" dirty="0">
@@ -13266,7 +13266,7 @@
                 <a:latin typeface="Arial" panose="020B0604020202020204" pitchFamily="34" charset="0"/>
                 <a:cs typeface="Arial" panose="020B0604020202020204" pitchFamily="34" charset="0"/>
               </a:rPr>
-              <a:t>cl_div_alt_one_msg</a:t>
+              <a:t>cl_div_alt_one_message</a:t>
             </a:r>
             <a:endParaRPr lang="de-CH" sz="900" b="1" dirty="0">
               <a:latin typeface="Arial" panose="020B0604020202020204" pitchFamily="34" charset="0"/>

</xml_diff>